<commit_message>
add new ex and change on presentation nodeJS
</commit_message>
<xml_diff>
--- a/presentations/nodeJS.pptx
+++ b/presentations/nodeJS.pptx
@@ -5,60 +5,61 @@
     <p:sldMasterId id="2147483660" r:id="rId1"/>
   </p:sldMasterIdLst>
   <p:notesMasterIdLst>
-    <p:notesMasterId r:id="rId31"/>
+    <p:notesMasterId r:id="rId32"/>
   </p:notesMasterIdLst>
   <p:sldIdLst>
     <p:sldId id="256" r:id="rId2"/>
     <p:sldId id="275" r:id="rId3"/>
     <p:sldId id="263" r:id="rId4"/>
     <p:sldId id="267" r:id="rId5"/>
-    <p:sldId id="272" r:id="rId6"/>
-    <p:sldId id="271" r:id="rId7"/>
-    <p:sldId id="270" r:id="rId8"/>
-    <p:sldId id="269" r:id="rId9"/>
-    <p:sldId id="276" r:id="rId10"/>
+    <p:sldId id="297" r:id="rId6"/>
+    <p:sldId id="272" r:id="rId7"/>
+    <p:sldId id="271" r:id="rId8"/>
+    <p:sldId id="270" r:id="rId9"/>
+    <p:sldId id="269" r:id="rId10"/>
     <p:sldId id="277" r:id="rId11"/>
     <p:sldId id="281" r:id="rId12"/>
     <p:sldId id="287" r:id="rId13"/>
     <p:sldId id="278" r:id="rId14"/>
     <p:sldId id="289" r:id="rId15"/>
     <p:sldId id="290" r:id="rId16"/>
-    <p:sldId id="291" r:id="rId17"/>
-    <p:sldId id="292" r:id="rId18"/>
-    <p:sldId id="294" r:id="rId19"/>
-    <p:sldId id="295" r:id="rId20"/>
-    <p:sldId id="296" r:id="rId21"/>
-    <p:sldId id="273" r:id="rId22"/>
-    <p:sldId id="279" r:id="rId23"/>
-    <p:sldId id="293" r:id="rId24"/>
-    <p:sldId id="283" r:id="rId25"/>
-    <p:sldId id="285" r:id="rId26"/>
-    <p:sldId id="280" r:id="rId27"/>
+    <p:sldId id="298" r:id="rId17"/>
+    <p:sldId id="291" r:id="rId18"/>
+    <p:sldId id="299" r:id="rId19"/>
+    <p:sldId id="294" r:id="rId20"/>
+    <p:sldId id="295" r:id="rId21"/>
+    <p:sldId id="296" r:id="rId22"/>
+    <p:sldId id="273" r:id="rId23"/>
+    <p:sldId id="279" r:id="rId24"/>
+    <p:sldId id="293" r:id="rId25"/>
+    <p:sldId id="283" r:id="rId26"/>
+    <p:sldId id="285" r:id="rId27"/>
     <p:sldId id="286" r:id="rId28"/>
-    <p:sldId id="274" r:id="rId29"/>
-    <p:sldId id="282" r:id="rId30"/>
+    <p:sldId id="280" r:id="rId29"/>
+    <p:sldId id="274" r:id="rId30"/>
+    <p:sldId id="282" r:id="rId31"/>
   </p:sldIdLst>
   <p:sldSz cx="12192000" cy="6858000"/>
   <p:notesSz cx="6858000" cy="9144000"/>
   <p:embeddedFontLst>
     <p:embeddedFont>
+      <p:font typeface="Franklin Gothic Book" panose="020B0604020202020204" charset="0"/>
+      <p:regular r:id="rId33"/>
+      <p:italic r:id="rId34"/>
+    </p:embeddedFont>
+    <p:embeddedFont>
       <p:font typeface="Consolas" panose="020B0609020204030204" pitchFamily="49" charset="0"/>
-      <p:regular r:id="rId32"/>
-      <p:bold r:id="rId33"/>
-      <p:italic r:id="rId34"/>
-      <p:boldItalic r:id="rId35"/>
+      <p:regular r:id="rId35"/>
+      <p:bold r:id="rId36"/>
+      <p:italic r:id="rId37"/>
+      <p:boldItalic r:id="rId38"/>
     </p:embeddedFont>
     <p:embeddedFont>
       <p:font typeface="Calibri" panose="020F0502020204030204" pitchFamily="34" charset="0"/>
-      <p:regular r:id="rId36"/>
-      <p:bold r:id="rId37"/>
-      <p:italic r:id="rId38"/>
-      <p:boldItalic r:id="rId39"/>
-    </p:embeddedFont>
-    <p:embeddedFont>
-      <p:font typeface="Franklin Gothic Book" panose="020B0604020202020204" charset="0"/>
-      <p:regular r:id="rId40"/>
+      <p:regular r:id="rId39"/>
+      <p:bold r:id="rId40"/>
       <p:italic r:id="rId41"/>
+      <p:boldItalic r:id="rId42"/>
     </p:embeddedFont>
   </p:embeddedFontLst>
   <p:defaultTextStyle>
@@ -246,7 +247,7 @@
           <a:p>
             <a:fld id="{40C9EC12-D619-4239-BA0B-F64B757C48A8}" type="datetimeFigureOut">
               <a:rPr lang="bg-BG" smtClean="0"/>
-              <a:t>21.3.2017 г.</a:t>
+              <a:t>22.3.2017 г.</a:t>
             </a:fld>
             <a:endParaRPr lang="bg-BG"/>
           </a:p>
@@ -1473,7 +1474,7 @@
           <a:p>
             <a:fld id="{52B7F6F4-ECB0-4FA5-B3FD-41E3D15A4260}" type="slidenum">
               <a:rPr lang="bg-BG" smtClean="0"/>
-              <a:t>22</a:t>
+              <a:t>23</a:t>
             </a:fld>
             <a:endParaRPr lang="bg-BG"/>
           </a:p>
@@ -1557,7 +1558,7 @@
           <a:p>
             <a:fld id="{52B7F6F4-ECB0-4FA5-B3FD-41E3D15A4260}" type="slidenum">
               <a:rPr lang="bg-BG" smtClean="0"/>
-              <a:t>25</a:t>
+              <a:t>26</a:t>
             </a:fld>
             <a:endParaRPr lang="bg-BG"/>
           </a:p>
@@ -1746,7 +1747,7 @@
             <a:fld id="{87DE6118-2437-4B30-8E3C-4D2BE6020583}" type="datetimeFigureOut">
               <a:rPr lang="en-US" smtClean="0"/>
               <a:pPr/>
-              <a:t>3/21/2017</a:t>
+              <a:t>3/22/2017</a:t>
             </a:fld>
             <a:endParaRPr lang="en-US" dirty="0"/>
           </a:p>
@@ -2077,7 +2078,7 @@
           <a:p>
             <a:fld id="{87DE6118-2437-4B30-8E3C-4D2BE6020583}" type="datetimeFigureOut">
               <a:rPr lang="en-US" smtClean="0"/>
-              <a:t>3/21/2017</a:t>
+              <a:t>3/22/2017</a:t>
             </a:fld>
             <a:endParaRPr lang="en-US" dirty="0"/>
           </a:p>
@@ -2256,7 +2257,7 @@
           <a:p>
             <a:fld id="{87DE6118-2437-4B30-8E3C-4D2BE6020583}" type="datetimeFigureOut">
               <a:rPr lang="en-US" smtClean="0"/>
-              <a:t>3/21/2017</a:t>
+              <a:t>3/22/2017</a:t>
             </a:fld>
             <a:endParaRPr lang="en-US" dirty="0"/>
           </a:p>
@@ -2437,7 +2438,7 @@
             <a:fld id="{87DE6118-2437-4B30-8E3C-4D2BE6020583}" type="datetimeFigureOut">
               <a:rPr lang="en-US" smtClean="0"/>
               <a:pPr/>
-              <a:t>3/21/2017</a:t>
+              <a:t>3/22/2017</a:t>
             </a:fld>
             <a:endParaRPr lang="en-US" dirty="0"/>
           </a:p>
@@ -2649,7 +2650,7 @@
           <a:p>
             <a:fld id="{87DE6118-2437-4B30-8E3C-4D2BE6020583}" type="datetimeFigureOut">
               <a:rPr lang="en-US" smtClean="0"/>
-              <a:t>3/21/2017</a:t>
+              <a:t>3/22/2017</a:t>
             </a:fld>
             <a:endParaRPr lang="en-US" dirty="0"/>
           </a:p>
@@ -2933,7 +2934,7 @@
             <a:fld id="{87DE6118-2437-4B30-8E3C-4D2BE6020583}" type="datetimeFigureOut">
               <a:rPr lang="en-US" smtClean="0"/>
               <a:pPr/>
-              <a:t>3/21/2017</a:t>
+              <a:t>3/22/2017</a:t>
             </a:fld>
             <a:endParaRPr lang="en-US" dirty="0"/>
           </a:p>
@@ -3328,7 +3329,7 @@
           <a:p>
             <a:fld id="{87DE6118-2437-4B30-8E3C-4D2BE6020583}" type="datetimeFigureOut">
               <a:rPr lang="en-US" smtClean="0"/>
-              <a:t>3/21/2017</a:t>
+              <a:t>3/22/2017</a:t>
             </a:fld>
             <a:endParaRPr lang="en-US" dirty="0"/>
           </a:p>
@@ -3805,7 +3806,7 @@
           <a:p>
             <a:fld id="{87DE6118-2437-4B30-8E3C-4D2BE6020583}" type="datetimeFigureOut">
               <a:rPr lang="en-US" smtClean="0"/>
-              <a:t>3/21/2017</a:t>
+              <a:t>3/22/2017</a:t>
             </a:fld>
             <a:endParaRPr lang="en-US" dirty="0"/>
           </a:p>
@@ -3923,7 +3924,7 @@
           <a:p>
             <a:fld id="{87DE6118-2437-4B30-8E3C-4D2BE6020583}" type="datetimeFigureOut">
               <a:rPr lang="en-US" smtClean="0"/>
-              <a:t>3/21/2017</a:t>
+              <a:t>3/22/2017</a:t>
             </a:fld>
             <a:endParaRPr lang="en-US" dirty="0"/>
           </a:p>
@@ -4018,7 +4019,7 @@
           <a:p>
             <a:fld id="{87DE6118-2437-4B30-8E3C-4D2BE6020583}" type="datetimeFigureOut">
               <a:rPr lang="en-US" smtClean="0"/>
-              <a:t>3/21/2017</a:t>
+              <a:t>3/22/2017</a:t>
             </a:fld>
             <a:endParaRPr lang="en-US" dirty="0"/>
           </a:p>
@@ -4365,7 +4366,7 @@
             <a:fld id="{87DE6118-2437-4B30-8E3C-4D2BE6020583}" type="datetimeFigureOut">
               <a:rPr lang="en-US" smtClean="0"/>
               <a:pPr/>
-              <a:t>3/21/2017</a:t>
+              <a:t>3/22/2017</a:t>
             </a:fld>
             <a:endParaRPr lang="en-US" dirty="0"/>
           </a:p>
@@ -4755,7 +4756,7 @@
             <a:fld id="{87DE6118-2437-4B30-8E3C-4D2BE6020583}" type="datetimeFigureOut">
               <a:rPr lang="en-US" smtClean="0"/>
               <a:pPr/>
-              <a:t>3/21/2017</a:t>
+              <a:t>3/22/2017</a:t>
             </a:fld>
             <a:endParaRPr lang="en-US" dirty="0"/>
           </a:p>
@@ -5035,7 +5036,7 @@
             <a:fld id="{87DE6118-2437-4B30-8E3C-4D2BE6020583}" type="datetimeFigureOut">
               <a:rPr lang="en-US" smtClean="0"/>
               <a:pPr/>
-              <a:t>3/21/2017</a:t>
+              <a:t>3/22/2017</a:t>
             </a:fld>
             <a:endParaRPr lang="en-US" dirty="0"/>
           </a:p>
@@ -6490,6 +6491,211 @@
 <file path=ppt/slides/slide15.xml><?xml version="1.0" encoding="utf-8"?>
 <p:sld xmlns:a="http://schemas.openxmlformats.org/drawingml/2006/main" xmlns:r="http://schemas.openxmlformats.org/officeDocument/2006/relationships" xmlns:p="http://schemas.openxmlformats.org/presentationml/2006/main">
   <p:cSld>
+    <p:spTree>
+      <p:nvGrpSpPr>
+        <p:cNvPr id="1" name=""/>
+        <p:cNvGrpSpPr/>
+        <p:nvPr/>
+      </p:nvGrpSpPr>
+      <p:grpSpPr>
+        <a:xfrm>
+          <a:off x="0" y="0"/>
+          <a:ext cx="0" cy="0"/>
+          <a:chOff x="0" y="0"/>
+          <a:chExt cx="0" cy="0"/>
+        </a:xfrm>
+      </p:grpSpPr>
+      <p:sp>
+        <p:nvSpPr>
+          <p:cNvPr id="5" name="Text Placeholder 4"/>
+          <p:cNvSpPr>
+            <a:spLocks noGrp="1"/>
+          </p:cNvSpPr>
+          <p:nvPr>
+            <p:ph type="body" idx="1"/>
+          </p:nvPr>
+        </p:nvSpPr>
+        <p:spPr/>
+        <p:txBody>
+          <a:bodyPr/>
+          <a:lstStyle/>
+          <a:p>
+            <a:r>
+              <a:rPr lang="en-US" b="1" dirty="0" smtClean="0">
+                <a:solidFill>
+                  <a:srgbClr val="0070C0"/>
+                </a:solidFill>
+              </a:rPr>
+              <a:t>Blocking code</a:t>
+            </a:r>
+            <a:endParaRPr lang="bg-BG" b="1" dirty="0">
+              <a:solidFill>
+                <a:srgbClr val="0070C0"/>
+              </a:solidFill>
+            </a:endParaRPr>
+          </a:p>
+        </p:txBody>
+      </p:sp>
+      <p:sp>
+        <p:nvSpPr>
+          <p:cNvPr id="4" name="Content Placeholder 3"/>
+          <p:cNvSpPr>
+            <a:spLocks noGrp="1"/>
+          </p:cNvSpPr>
+          <p:nvPr>
+            <p:ph sz="half" idx="2"/>
+          </p:nvPr>
+        </p:nvSpPr>
+        <p:spPr/>
+        <p:txBody>
+          <a:bodyPr>
+            <a:normAutofit lnSpcReduction="10000"/>
+          </a:bodyPr>
+          <a:lstStyle/>
+          <a:p>
+            <a:r>
+              <a:rPr lang="en-US" sz="3200" dirty="0" smtClean="0">
+                <a:solidFill>
+                  <a:schemeClr val="tx1"/>
+                </a:solidFill>
+              </a:rPr>
+              <a:t>Read file from filesystem, set equal to “contents”</a:t>
+            </a:r>
+          </a:p>
+          <a:p>
+            <a:r>
+              <a:rPr lang="en-US" sz="3200" dirty="0" smtClean="0">
+                <a:solidFill>
+                  <a:schemeClr val="tx1"/>
+                </a:solidFill>
+              </a:rPr>
+              <a:t>Print contents</a:t>
+            </a:r>
+          </a:p>
+          <a:p>
+            <a:r>
+              <a:rPr lang="en-US" sz="3200" dirty="0" smtClean="0">
+                <a:solidFill>
+                  <a:schemeClr val="tx1"/>
+                </a:solidFill>
+              </a:rPr>
+              <a:t>Do something else</a:t>
+            </a:r>
+            <a:endParaRPr lang="bg-BG" sz="3200" dirty="0">
+              <a:solidFill>
+                <a:schemeClr val="tx1"/>
+              </a:solidFill>
+            </a:endParaRPr>
+          </a:p>
+        </p:txBody>
+      </p:sp>
+      <p:sp>
+        <p:nvSpPr>
+          <p:cNvPr id="6" name="Text Placeholder 5"/>
+          <p:cNvSpPr>
+            <a:spLocks noGrp="1"/>
+          </p:cNvSpPr>
+          <p:nvPr>
+            <p:ph type="body" sz="quarter" idx="3"/>
+          </p:nvPr>
+        </p:nvSpPr>
+        <p:spPr/>
+        <p:txBody>
+          <a:bodyPr/>
+          <a:lstStyle/>
+          <a:p>
+            <a:r>
+              <a:rPr lang="en-US" b="1" dirty="0" smtClean="0">
+                <a:solidFill>
+                  <a:srgbClr val="0070C0"/>
+                </a:solidFill>
+              </a:rPr>
+              <a:t>Non – Blocking code</a:t>
+            </a:r>
+            <a:endParaRPr lang="bg-BG" b="1" dirty="0">
+              <a:solidFill>
+                <a:srgbClr val="0070C0"/>
+              </a:solidFill>
+            </a:endParaRPr>
+          </a:p>
+        </p:txBody>
+      </p:sp>
+      <p:sp>
+        <p:nvSpPr>
+          <p:cNvPr id="7" name="Content Placeholder 6"/>
+          <p:cNvSpPr>
+            <a:spLocks noGrp="1"/>
+          </p:cNvSpPr>
+          <p:nvPr>
+            <p:ph sz="quarter" idx="4"/>
+          </p:nvPr>
+        </p:nvSpPr>
+        <p:spPr/>
+        <p:txBody>
+          <a:bodyPr>
+            <a:normAutofit/>
+          </a:bodyPr>
+          <a:lstStyle/>
+          <a:p>
+            <a:r>
+              <a:rPr lang="en-US" sz="3200" dirty="0" smtClean="0"/>
+              <a:t>Read file from filesystem</a:t>
+            </a:r>
+          </a:p>
+          <a:p>
+            <a:r>
+              <a:rPr lang="en-US" sz="3200" dirty="0" smtClean="0"/>
+              <a:t>Do something else</a:t>
+            </a:r>
+          </a:p>
+          <a:p>
+            <a:r>
+              <a:rPr lang="en-US" sz="3200" dirty="0" smtClean="0"/>
+              <a:t>Print contents</a:t>
+            </a:r>
+            <a:endParaRPr lang="bg-BG" sz="3200" dirty="0"/>
+          </a:p>
+        </p:txBody>
+      </p:sp>
+      <p:sp>
+        <p:nvSpPr>
+          <p:cNvPr id="8" name="Title 7"/>
+          <p:cNvSpPr>
+            <a:spLocks noGrp="1"/>
+          </p:cNvSpPr>
+          <p:nvPr>
+            <p:ph type="title"/>
+          </p:nvPr>
+        </p:nvSpPr>
+        <p:spPr/>
+        <p:txBody>
+          <a:bodyPr/>
+          <a:lstStyle/>
+          <a:p>
+            <a:r>
+              <a:rPr lang="en-US" dirty="0" smtClean="0"/>
+              <a:t>Blocking and Non -  Blocking</a:t>
+            </a:r>
+            <a:endParaRPr lang="bg-BG" dirty="0"/>
+          </a:p>
+        </p:txBody>
+      </p:sp>
+    </p:spTree>
+    <p:extLst>
+      <p:ext uri="{BB962C8B-B14F-4D97-AF65-F5344CB8AC3E}">
+        <p14:creationId xmlns:p14="http://schemas.microsoft.com/office/powerpoint/2010/main" val="520180707"/>
+      </p:ext>
+    </p:extLst>
+  </p:cSld>
+  <p:clrMapOvr>
+    <a:masterClrMapping/>
+  </p:clrMapOvr>
+</p:sld>
+</file>
+
+<file path=ppt/slides/slide16.xml><?xml version="1.0" encoding="utf-8"?>
+<p:sld xmlns:a="http://schemas.openxmlformats.org/drawingml/2006/main" xmlns:r="http://schemas.openxmlformats.org/officeDocument/2006/relationships" xmlns:p="http://schemas.openxmlformats.org/presentationml/2006/main">
+  <p:cSld>
     <p:bg>
       <p:bgPr>
         <a:solidFill>
@@ -6579,419 +6785,7 @@
     </p:spTree>
     <p:extLst>
       <p:ext uri="{BB962C8B-B14F-4D97-AF65-F5344CB8AC3E}">
-        <p14:creationId xmlns:p14="http://schemas.microsoft.com/office/powerpoint/2010/main" val="520180707"/>
-      </p:ext>
-    </p:extLst>
-  </p:cSld>
-  <p:clrMapOvr>
-    <a:masterClrMapping/>
-  </p:clrMapOvr>
-</p:sld>
-</file>
-
-<file path=ppt/slides/slide16.xml><?xml version="1.0" encoding="utf-8"?>
-<p:sld xmlns:a="http://schemas.openxmlformats.org/drawingml/2006/main" xmlns:r="http://schemas.openxmlformats.org/officeDocument/2006/relationships" xmlns:p="http://schemas.openxmlformats.org/presentationml/2006/main">
-  <p:cSld>
-    <p:spTree>
-      <p:nvGrpSpPr>
-        <p:cNvPr id="1" name=""/>
-        <p:cNvGrpSpPr/>
-        <p:nvPr/>
-      </p:nvGrpSpPr>
-      <p:grpSpPr>
-        <a:xfrm>
-          <a:off x="0" y="0"/>
-          <a:ext cx="0" cy="0"/>
-          <a:chOff x="0" y="0"/>
-          <a:chExt cx="0" cy="0"/>
-        </a:xfrm>
-      </p:grpSpPr>
-      <p:sp>
-        <p:nvSpPr>
-          <p:cNvPr id="11" name="Text Placeholder 10"/>
-          <p:cNvSpPr>
-            <a:spLocks noGrp="1"/>
-          </p:cNvSpPr>
-          <p:nvPr>
-            <p:ph type="body" sz="quarter" idx="13"/>
-          </p:nvPr>
-        </p:nvSpPr>
-        <p:spPr/>
-        <p:txBody>
-          <a:bodyPr>
-            <a:normAutofit/>
-          </a:bodyPr>
-          <a:lstStyle/>
-          <a:p>
-            <a:r>
-              <a:rPr lang="en-US" dirty="0"/>
-              <a:t>Callback function</a:t>
-            </a:r>
-            <a:endParaRPr lang="bg-BG" dirty="0"/>
-          </a:p>
-        </p:txBody>
-      </p:sp>
-      <p:sp>
-        <p:nvSpPr>
-          <p:cNvPr id="4" name="Title 3"/>
-          <p:cNvSpPr>
-            <a:spLocks noGrp="1"/>
-          </p:cNvSpPr>
-          <p:nvPr>
-            <p:ph type="title"/>
-          </p:nvPr>
-        </p:nvSpPr>
-        <p:spPr/>
-        <p:txBody>
-          <a:bodyPr>
-            <a:normAutofit/>
-          </a:bodyPr>
-          <a:lstStyle/>
-          <a:p>
-            <a:r>
-              <a:rPr lang="en-US" sz="2400" dirty="0">
-                <a:solidFill>
-                  <a:srgbClr val="FBDE2D"/>
-                </a:solidFill>
-              </a:rPr>
-              <a:t>function</a:t>
-            </a:r>
-            <a:r>
-              <a:rPr lang="en-US" sz="2400" dirty="0">
-                <a:solidFill>
-                  <a:srgbClr val="F8F8F8"/>
-                </a:solidFill>
-              </a:rPr>
-              <a:t> </a:t>
-            </a:r>
-            <a:r>
-              <a:rPr lang="en-US" sz="2400" dirty="0" err="1">
-                <a:solidFill>
-                  <a:srgbClr val="F8F8F8"/>
-                </a:solidFill>
-              </a:rPr>
-              <a:t>some_function</a:t>
-            </a:r>
-            <a:r>
-              <a:rPr lang="en-US" sz="2400" dirty="0">
-                <a:solidFill>
-                  <a:srgbClr val="F8F8F8"/>
-                </a:solidFill>
-              </a:rPr>
-              <a:t>(arg1, arg2, callback) {</a:t>
-            </a:r>
-            <a:br>
-              <a:rPr lang="en-US" sz="2400" dirty="0">
-                <a:solidFill>
-                  <a:srgbClr val="F8F8F8"/>
-                </a:solidFill>
-              </a:rPr>
-            </a:br>
-            <a:r>
-              <a:rPr lang="en-US" sz="2400" dirty="0">
-                <a:solidFill>
-                  <a:srgbClr val="F8F8F8"/>
-                </a:solidFill>
-              </a:rPr>
-              <a:t>  </a:t>
-            </a:r>
-            <a:r>
-              <a:rPr lang="en-US" sz="2400" dirty="0" err="1">
-                <a:solidFill>
-                  <a:srgbClr val="FBDE2D"/>
-                </a:solidFill>
-              </a:rPr>
-              <a:t>var</a:t>
-            </a:r>
-            <a:r>
-              <a:rPr lang="en-US" sz="2400" dirty="0">
-                <a:solidFill>
-                  <a:srgbClr val="F8F8F8"/>
-                </a:solidFill>
-              </a:rPr>
-              <a:t> </a:t>
-            </a:r>
-            <a:r>
-              <a:rPr lang="en-US" sz="2400" dirty="0" err="1">
-                <a:solidFill>
-                  <a:srgbClr val="F8F8F8"/>
-                </a:solidFill>
-              </a:rPr>
-              <a:t>my_number</a:t>
-            </a:r>
-            <a:r>
-              <a:rPr lang="en-US" sz="2400" dirty="0">
-                <a:solidFill>
-                  <a:srgbClr val="F8F8F8"/>
-                </a:solidFill>
-              </a:rPr>
-              <a:t> = </a:t>
-            </a:r>
-            <a:r>
-              <a:rPr lang="en-US" sz="2400" dirty="0" err="1">
-                <a:solidFill>
-                  <a:srgbClr val="F8F8F8"/>
-                </a:solidFill>
-              </a:rPr>
-              <a:t>Math.ceil</a:t>
-            </a:r>
-            <a:r>
-              <a:rPr lang="en-US" sz="2400" dirty="0">
-                <a:solidFill>
-                  <a:srgbClr val="F8F8F8"/>
-                </a:solidFill>
-              </a:rPr>
-              <a:t>(</a:t>
-            </a:r>
-            <a:r>
-              <a:rPr lang="en-US" sz="2400" dirty="0" err="1">
-                <a:solidFill>
-                  <a:srgbClr val="F8F8F8"/>
-                </a:solidFill>
-              </a:rPr>
-              <a:t>Math.random</a:t>
-            </a:r>
-            <a:r>
-              <a:rPr lang="en-US" sz="2400" dirty="0">
-                <a:solidFill>
-                  <a:srgbClr val="F8F8F8"/>
-                </a:solidFill>
-              </a:rPr>
-              <a:t>() * (arg1 - arg2) + arg2);</a:t>
-            </a:r>
-            <a:br>
-              <a:rPr lang="en-US" sz="2400" dirty="0">
-                <a:solidFill>
-                  <a:srgbClr val="F8F8F8"/>
-                </a:solidFill>
-              </a:rPr>
-            </a:br>
-            <a:r>
-              <a:rPr lang="bg-BG" sz="2400" dirty="0">
-                <a:solidFill>
-                  <a:srgbClr val="F8F8F8"/>
-                </a:solidFill>
-              </a:rPr>
-              <a:t>  </a:t>
-            </a:r>
-            <a:br>
-              <a:rPr lang="bg-BG" sz="2400" dirty="0">
-                <a:solidFill>
-                  <a:srgbClr val="F8F8F8"/>
-                </a:solidFill>
-              </a:rPr>
-            </a:br>
-            <a:r>
-              <a:rPr lang="en-US" sz="2400" dirty="0">
-                <a:solidFill>
-                  <a:srgbClr val="F8F8F8"/>
-                </a:solidFill>
-              </a:rPr>
-              <a:t>  callback(</a:t>
-            </a:r>
-            <a:r>
-              <a:rPr lang="en-US" sz="2400" dirty="0" err="1">
-                <a:solidFill>
-                  <a:srgbClr val="F8F8F8"/>
-                </a:solidFill>
-              </a:rPr>
-              <a:t>my_number</a:t>
-            </a:r>
-            <a:r>
-              <a:rPr lang="en-US" sz="2400" dirty="0">
-                <a:solidFill>
-                  <a:srgbClr val="F8F8F8"/>
-                </a:solidFill>
-              </a:rPr>
-              <a:t>);</a:t>
-            </a:r>
-            <a:br>
-              <a:rPr lang="en-US" sz="2400" dirty="0">
-                <a:solidFill>
-                  <a:srgbClr val="F8F8F8"/>
-                </a:solidFill>
-              </a:rPr>
-            </a:br>
-            <a:r>
-              <a:rPr lang="bg-BG" sz="2400" dirty="0">
-                <a:solidFill>
-                  <a:srgbClr val="F8F8F8"/>
-                </a:solidFill>
-              </a:rPr>
-              <a:t>}</a:t>
-            </a:r>
-            <a:br>
-              <a:rPr lang="bg-BG" sz="2400" dirty="0">
-                <a:solidFill>
-                  <a:srgbClr val="F8F8F8"/>
-                </a:solidFill>
-              </a:rPr>
-            </a:br>
-            <a:r>
-              <a:rPr lang="bg-BG" sz="2400" dirty="0">
-                <a:solidFill>
-                  <a:srgbClr val="F8F8F8"/>
-                </a:solidFill>
-              </a:rPr>
-              <a:t/>
-            </a:r>
-            <a:br>
-              <a:rPr lang="bg-BG" sz="2400" dirty="0">
-                <a:solidFill>
-                  <a:srgbClr val="F8F8F8"/>
-                </a:solidFill>
-              </a:rPr>
-            </a:br>
-            <a:r>
-              <a:rPr lang="en-US" sz="2400" dirty="0" err="1">
-                <a:solidFill>
-                  <a:srgbClr val="F8F8F8"/>
-                </a:solidFill>
-              </a:rPr>
-              <a:t>some_function</a:t>
-            </a:r>
-            <a:r>
-              <a:rPr lang="en-US" sz="2400" dirty="0">
-                <a:solidFill>
-                  <a:srgbClr val="F8F8F8"/>
-                </a:solidFill>
-              </a:rPr>
-              <a:t>(</a:t>
-            </a:r>
-            <a:r>
-              <a:rPr lang="en-US" sz="2400" dirty="0">
-                <a:solidFill>
-                  <a:srgbClr val="D8FA3C"/>
-                </a:solidFill>
-              </a:rPr>
-              <a:t>5</a:t>
-            </a:r>
-            <a:r>
-              <a:rPr lang="en-US" sz="2400" dirty="0">
-                <a:solidFill>
-                  <a:srgbClr val="F8F8F8"/>
-                </a:solidFill>
-              </a:rPr>
-              <a:t>, </a:t>
-            </a:r>
-            <a:r>
-              <a:rPr lang="en-US" sz="2400" dirty="0">
-                <a:solidFill>
-                  <a:srgbClr val="D8FA3C"/>
-                </a:solidFill>
-              </a:rPr>
-              <a:t>15</a:t>
-            </a:r>
-            <a:r>
-              <a:rPr lang="en-US" sz="2400" dirty="0">
-                <a:solidFill>
-                  <a:srgbClr val="F8F8F8"/>
-                </a:solidFill>
-              </a:rPr>
-              <a:t>, </a:t>
-            </a:r>
-            <a:r>
-              <a:rPr lang="en-US" sz="2400" dirty="0">
-                <a:solidFill>
-                  <a:srgbClr val="FBDE2D"/>
-                </a:solidFill>
-              </a:rPr>
-              <a:t>function</a:t>
-            </a:r>
-            <a:r>
-              <a:rPr lang="en-US" sz="2400" dirty="0">
-                <a:solidFill>
-                  <a:srgbClr val="F8F8F8"/>
-                </a:solidFill>
-              </a:rPr>
-              <a:t>(</a:t>
-            </a:r>
-            <a:r>
-              <a:rPr lang="en-US" sz="2400" dirty="0" err="1">
-                <a:solidFill>
-                  <a:srgbClr val="F8F8F8"/>
-                </a:solidFill>
-              </a:rPr>
-              <a:t>num</a:t>
-            </a:r>
-            <a:r>
-              <a:rPr lang="en-US" sz="2400" dirty="0">
-                <a:solidFill>
-                  <a:srgbClr val="F8F8F8"/>
-                </a:solidFill>
-              </a:rPr>
-              <a:t>) {</a:t>
-            </a:r>
-            <a:br>
-              <a:rPr lang="en-US" sz="2400" dirty="0">
-                <a:solidFill>
-                  <a:srgbClr val="F8F8F8"/>
-                </a:solidFill>
-              </a:rPr>
-            </a:br>
-            <a:r>
-              <a:rPr lang="en-US" sz="2400" dirty="0">
-                <a:solidFill>
-                  <a:srgbClr val="F8F8F8"/>
-                </a:solidFill>
-              </a:rPr>
-              <a:t>  console.log(</a:t>
-            </a:r>
-            <a:r>
-              <a:rPr lang="en-US" sz="2400" dirty="0">
-                <a:solidFill>
-                  <a:srgbClr val="61CE3C"/>
-                </a:solidFill>
-              </a:rPr>
-              <a:t>"callback called! "</a:t>
-            </a:r>
-            <a:r>
-              <a:rPr lang="en-US" sz="2400" dirty="0">
-                <a:solidFill>
-                  <a:srgbClr val="F8F8F8"/>
-                </a:solidFill>
-              </a:rPr>
-              <a:t> + </a:t>
-            </a:r>
-            <a:r>
-              <a:rPr lang="en-US" sz="2400" dirty="0" err="1">
-                <a:solidFill>
-                  <a:srgbClr val="F8F8F8"/>
-                </a:solidFill>
-              </a:rPr>
-              <a:t>num</a:t>
-            </a:r>
-            <a:r>
-              <a:rPr lang="en-US" sz="2400" dirty="0">
-                <a:solidFill>
-                  <a:srgbClr val="F8F8F8"/>
-                </a:solidFill>
-              </a:rPr>
-              <a:t>);</a:t>
-            </a:r>
-            <a:br>
-              <a:rPr lang="en-US" sz="2400" dirty="0">
-                <a:solidFill>
-                  <a:srgbClr val="F8F8F8"/>
-                </a:solidFill>
-              </a:rPr>
-            </a:br>
-            <a:r>
-              <a:rPr lang="bg-BG" sz="2400" dirty="0">
-                <a:solidFill>
-                  <a:srgbClr val="F8F8F8"/>
-                </a:solidFill>
-              </a:rPr>
-              <a:t>});</a:t>
-            </a:r>
-            <a:endParaRPr lang="bg-BG" sz="2400" dirty="0"/>
-          </a:p>
-        </p:txBody>
-      </p:sp>
-    </p:spTree>
-    <p:extLst>
-      <p:ext uri="{BB962C8B-B14F-4D97-AF65-F5344CB8AC3E}">
-        <p14:creationId xmlns:p14="http://schemas.microsoft.com/office/powerpoint/2010/main" val="1944296581"/>
+        <p14:creationId xmlns:p14="http://schemas.microsoft.com/office/powerpoint/2010/main" val="4036935580"/>
       </p:ext>
     </p:extLst>
   </p:cSld>
@@ -7020,7 +6814,32 @@
       </p:grpSpPr>
       <p:sp>
         <p:nvSpPr>
-          <p:cNvPr id="5" name="Title 4"/>
+          <p:cNvPr id="11" name="Text Placeholder 10"/>
+          <p:cNvSpPr>
+            <a:spLocks noGrp="1"/>
+          </p:cNvSpPr>
+          <p:nvPr>
+            <p:ph type="body" sz="quarter" idx="13"/>
+          </p:nvPr>
+        </p:nvSpPr>
+        <p:spPr/>
+        <p:txBody>
+          <a:bodyPr>
+            <a:normAutofit/>
+          </a:bodyPr>
+          <a:lstStyle/>
+          <a:p>
+            <a:r>
+              <a:rPr lang="en-US" dirty="0"/>
+              <a:t>Callback function</a:t>
+            </a:r>
+            <a:endParaRPr lang="bg-BG" dirty="0"/>
+          </a:p>
+        </p:txBody>
+      </p:sp>
+      <p:sp>
+        <p:nvSpPr>
+          <p:cNvPr id="4" name="Title 3"/>
           <p:cNvSpPr>
             <a:spLocks noGrp="1"/>
           </p:cNvSpPr>
@@ -7030,48 +6849,355 @@
         </p:nvSpPr>
         <p:spPr/>
         <p:txBody>
-          <a:bodyPr/>
-          <a:lstStyle/>
-          <a:p>
-            <a:r>
-              <a:rPr lang="en-US" dirty="0"/>
-              <a:t>Demo </a:t>
-            </a:r>
-            <a:r>
-              <a:rPr lang="en-US" dirty="0" err="1"/>
-              <a:t>javascripts</a:t>
-            </a:r>
-            <a:endParaRPr lang="bg-BG" dirty="0"/>
-          </a:p>
-        </p:txBody>
-      </p:sp>
-      <p:sp>
-        <p:nvSpPr>
-          <p:cNvPr id="6" name="Text Placeholder 5"/>
-          <p:cNvSpPr>
-            <a:spLocks noGrp="1"/>
-          </p:cNvSpPr>
-          <p:nvPr>
-            <p:ph type="body" idx="1"/>
-          </p:nvPr>
-        </p:nvSpPr>
-        <p:spPr/>
-        <p:txBody>
-          <a:bodyPr/>
-          <a:lstStyle/>
-          <a:p>
-            <a:r>
-              <a:rPr lang="en-US" dirty="0"/>
-              <a:t>ex2.1</a:t>
-            </a:r>
-            <a:endParaRPr lang="bg-BG" dirty="0"/>
+          <a:bodyPr>
+            <a:normAutofit/>
+          </a:bodyPr>
+          <a:lstStyle/>
+          <a:p>
+            <a:r>
+              <a:rPr lang="en-US" sz="2400" dirty="0">
+                <a:solidFill>
+                  <a:srgbClr val="FBDE2D"/>
+                </a:solidFill>
+              </a:rPr>
+              <a:t>function</a:t>
+            </a:r>
+            <a:r>
+              <a:rPr lang="en-US" sz="2400" dirty="0">
+                <a:solidFill>
+                  <a:srgbClr val="F8F8F8"/>
+                </a:solidFill>
+              </a:rPr>
+              <a:t> </a:t>
+            </a:r>
+            <a:r>
+              <a:rPr lang="en-US" sz="2400" dirty="0" err="1">
+                <a:solidFill>
+                  <a:srgbClr val="F8F8F8"/>
+                </a:solidFill>
+              </a:rPr>
+              <a:t>some_function</a:t>
+            </a:r>
+            <a:r>
+              <a:rPr lang="en-US" sz="2400" dirty="0">
+                <a:solidFill>
+                  <a:srgbClr val="F8F8F8"/>
+                </a:solidFill>
+              </a:rPr>
+              <a:t>(arg1, arg2, callback) {</a:t>
+            </a:r>
+            <a:br>
+              <a:rPr lang="en-US" sz="2400" dirty="0">
+                <a:solidFill>
+                  <a:srgbClr val="F8F8F8"/>
+                </a:solidFill>
+              </a:rPr>
+            </a:br>
+            <a:r>
+              <a:rPr lang="en-US" sz="2400" dirty="0">
+                <a:solidFill>
+                  <a:srgbClr val="F8F8F8"/>
+                </a:solidFill>
+              </a:rPr>
+              <a:t>  </a:t>
+            </a:r>
+            <a:r>
+              <a:rPr lang="en-US" sz="2400" dirty="0" err="1">
+                <a:solidFill>
+                  <a:srgbClr val="FBDE2D"/>
+                </a:solidFill>
+              </a:rPr>
+              <a:t>var</a:t>
+            </a:r>
+            <a:r>
+              <a:rPr lang="en-US" sz="2400" dirty="0">
+                <a:solidFill>
+                  <a:srgbClr val="F8F8F8"/>
+                </a:solidFill>
+              </a:rPr>
+              <a:t> </a:t>
+            </a:r>
+            <a:r>
+              <a:rPr lang="en-US" sz="2400" dirty="0" err="1">
+                <a:solidFill>
+                  <a:srgbClr val="F8F8F8"/>
+                </a:solidFill>
+              </a:rPr>
+              <a:t>my_number</a:t>
+            </a:r>
+            <a:r>
+              <a:rPr lang="en-US" sz="2400" dirty="0">
+                <a:solidFill>
+                  <a:srgbClr val="F8F8F8"/>
+                </a:solidFill>
+              </a:rPr>
+              <a:t> = </a:t>
+            </a:r>
+            <a:r>
+              <a:rPr lang="en-US" sz="2400" dirty="0" err="1">
+                <a:solidFill>
+                  <a:srgbClr val="F8F8F8"/>
+                </a:solidFill>
+              </a:rPr>
+              <a:t>Math.ceil</a:t>
+            </a:r>
+            <a:r>
+              <a:rPr lang="en-US" sz="2400" dirty="0">
+                <a:solidFill>
+                  <a:srgbClr val="F8F8F8"/>
+                </a:solidFill>
+              </a:rPr>
+              <a:t>(</a:t>
+            </a:r>
+            <a:r>
+              <a:rPr lang="en-US" sz="2400" dirty="0" err="1">
+                <a:solidFill>
+                  <a:srgbClr val="F8F8F8"/>
+                </a:solidFill>
+              </a:rPr>
+              <a:t>Math.random</a:t>
+            </a:r>
+            <a:r>
+              <a:rPr lang="en-US" sz="2400" dirty="0">
+                <a:solidFill>
+                  <a:srgbClr val="F8F8F8"/>
+                </a:solidFill>
+              </a:rPr>
+              <a:t>() * (arg1 - arg2) + arg2);</a:t>
+            </a:r>
+            <a:br>
+              <a:rPr lang="en-US" sz="2400" dirty="0">
+                <a:solidFill>
+                  <a:srgbClr val="F8F8F8"/>
+                </a:solidFill>
+              </a:rPr>
+            </a:br>
+            <a:r>
+              <a:rPr lang="bg-BG" sz="2400" dirty="0">
+                <a:solidFill>
+                  <a:srgbClr val="F8F8F8"/>
+                </a:solidFill>
+              </a:rPr>
+              <a:t>  </a:t>
+            </a:r>
+            <a:br>
+              <a:rPr lang="bg-BG" sz="2400" dirty="0">
+                <a:solidFill>
+                  <a:srgbClr val="F8F8F8"/>
+                </a:solidFill>
+              </a:rPr>
+            </a:br>
+            <a:r>
+              <a:rPr lang="en-US" sz="2400" dirty="0">
+                <a:solidFill>
+                  <a:srgbClr val="F8F8F8"/>
+                </a:solidFill>
+              </a:rPr>
+              <a:t>  callback(</a:t>
+            </a:r>
+            <a:r>
+              <a:rPr lang="en-US" sz="2400" dirty="0" err="1">
+                <a:solidFill>
+                  <a:srgbClr val="F8F8F8"/>
+                </a:solidFill>
+              </a:rPr>
+              <a:t>my_number</a:t>
+            </a:r>
+            <a:r>
+              <a:rPr lang="en-US" sz="2400" dirty="0">
+                <a:solidFill>
+                  <a:srgbClr val="F8F8F8"/>
+                </a:solidFill>
+              </a:rPr>
+              <a:t>);</a:t>
+            </a:r>
+            <a:br>
+              <a:rPr lang="en-US" sz="2400" dirty="0">
+                <a:solidFill>
+                  <a:srgbClr val="F8F8F8"/>
+                </a:solidFill>
+              </a:rPr>
+            </a:br>
+            <a:r>
+              <a:rPr lang="bg-BG" sz="2400" dirty="0">
+                <a:solidFill>
+                  <a:srgbClr val="F8F8F8"/>
+                </a:solidFill>
+              </a:rPr>
+              <a:t>}</a:t>
+            </a:r>
+            <a:br>
+              <a:rPr lang="bg-BG" sz="2400" dirty="0">
+                <a:solidFill>
+                  <a:srgbClr val="F8F8F8"/>
+                </a:solidFill>
+              </a:rPr>
+            </a:br>
+            <a:r>
+              <a:rPr lang="bg-BG" sz="2400" dirty="0">
+                <a:solidFill>
+                  <a:srgbClr val="F8F8F8"/>
+                </a:solidFill>
+              </a:rPr>
+              <a:t/>
+            </a:r>
+            <a:br>
+              <a:rPr lang="bg-BG" sz="2400" dirty="0">
+                <a:solidFill>
+                  <a:srgbClr val="F8F8F8"/>
+                </a:solidFill>
+              </a:rPr>
+            </a:br>
+            <a:r>
+              <a:rPr lang="en-US" sz="2400" dirty="0" err="1">
+                <a:solidFill>
+                  <a:srgbClr val="F8F8F8"/>
+                </a:solidFill>
+              </a:rPr>
+              <a:t>some_function</a:t>
+            </a:r>
+            <a:r>
+              <a:rPr lang="en-US" sz="2400" dirty="0">
+                <a:solidFill>
+                  <a:srgbClr val="F8F8F8"/>
+                </a:solidFill>
+              </a:rPr>
+              <a:t>(</a:t>
+            </a:r>
+            <a:r>
+              <a:rPr lang="en-US" sz="2400" dirty="0">
+                <a:solidFill>
+                  <a:srgbClr val="D8FA3C"/>
+                </a:solidFill>
+              </a:rPr>
+              <a:t>5</a:t>
+            </a:r>
+            <a:r>
+              <a:rPr lang="en-US" sz="2400" dirty="0">
+                <a:solidFill>
+                  <a:srgbClr val="F8F8F8"/>
+                </a:solidFill>
+              </a:rPr>
+              <a:t>, </a:t>
+            </a:r>
+            <a:r>
+              <a:rPr lang="en-US" sz="2400" dirty="0">
+                <a:solidFill>
+                  <a:srgbClr val="D8FA3C"/>
+                </a:solidFill>
+              </a:rPr>
+              <a:t>15</a:t>
+            </a:r>
+            <a:r>
+              <a:rPr lang="en-US" sz="2400" dirty="0">
+                <a:solidFill>
+                  <a:srgbClr val="F8F8F8"/>
+                </a:solidFill>
+              </a:rPr>
+              <a:t>, </a:t>
+            </a:r>
+            <a:r>
+              <a:rPr lang="en-US" sz="2400" dirty="0">
+                <a:solidFill>
+                  <a:srgbClr val="FBDE2D"/>
+                </a:solidFill>
+              </a:rPr>
+              <a:t>function</a:t>
+            </a:r>
+            <a:r>
+              <a:rPr lang="en-US" sz="2400" dirty="0">
+                <a:solidFill>
+                  <a:srgbClr val="F8F8F8"/>
+                </a:solidFill>
+              </a:rPr>
+              <a:t>(</a:t>
+            </a:r>
+            <a:r>
+              <a:rPr lang="en-US" sz="2400" dirty="0" err="1">
+                <a:solidFill>
+                  <a:srgbClr val="F8F8F8"/>
+                </a:solidFill>
+              </a:rPr>
+              <a:t>num</a:t>
+            </a:r>
+            <a:r>
+              <a:rPr lang="en-US" sz="2400" dirty="0">
+                <a:solidFill>
+                  <a:srgbClr val="F8F8F8"/>
+                </a:solidFill>
+              </a:rPr>
+              <a:t>) {</a:t>
+            </a:r>
+            <a:br>
+              <a:rPr lang="en-US" sz="2400" dirty="0">
+                <a:solidFill>
+                  <a:srgbClr val="F8F8F8"/>
+                </a:solidFill>
+              </a:rPr>
+            </a:br>
+            <a:r>
+              <a:rPr lang="en-US" sz="2400" dirty="0">
+                <a:solidFill>
+                  <a:srgbClr val="F8F8F8"/>
+                </a:solidFill>
+              </a:rPr>
+              <a:t>  console.log(</a:t>
+            </a:r>
+            <a:r>
+              <a:rPr lang="en-US" sz="2400" dirty="0">
+                <a:solidFill>
+                  <a:srgbClr val="61CE3C"/>
+                </a:solidFill>
+              </a:rPr>
+              <a:t>"callback called! "</a:t>
+            </a:r>
+            <a:r>
+              <a:rPr lang="en-US" sz="2400" dirty="0">
+                <a:solidFill>
+                  <a:srgbClr val="F8F8F8"/>
+                </a:solidFill>
+              </a:rPr>
+              <a:t> + </a:t>
+            </a:r>
+            <a:r>
+              <a:rPr lang="en-US" sz="2400" dirty="0" err="1">
+                <a:solidFill>
+                  <a:srgbClr val="F8F8F8"/>
+                </a:solidFill>
+              </a:rPr>
+              <a:t>num</a:t>
+            </a:r>
+            <a:r>
+              <a:rPr lang="en-US" sz="2400" dirty="0">
+                <a:solidFill>
+                  <a:srgbClr val="F8F8F8"/>
+                </a:solidFill>
+              </a:rPr>
+              <a:t>);</a:t>
+            </a:r>
+            <a:br>
+              <a:rPr lang="en-US" sz="2400" dirty="0">
+                <a:solidFill>
+                  <a:srgbClr val="F8F8F8"/>
+                </a:solidFill>
+              </a:rPr>
+            </a:br>
+            <a:r>
+              <a:rPr lang="bg-BG" sz="2400" dirty="0">
+                <a:solidFill>
+                  <a:srgbClr val="F8F8F8"/>
+                </a:solidFill>
+              </a:rPr>
+              <a:t>});</a:t>
+            </a:r>
+            <a:endParaRPr lang="bg-BG" sz="2400" dirty="0"/>
           </a:p>
         </p:txBody>
       </p:sp>
     </p:spTree>
     <p:extLst>
       <p:ext uri="{BB962C8B-B14F-4D97-AF65-F5344CB8AC3E}">
-        <p14:creationId xmlns:p14="http://schemas.microsoft.com/office/powerpoint/2010/main" val="2895397118"/>
+        <p14:creationId xmlns:p14="http://schemas.microsoft.com/office/powerpoint/2010/main" val="1944296581"/>
       </p:ext>
     </p:extLst>
   </p:cSld>
@@ -7082,6 +7208,86 @@
 </file>
 
 <file path=ppt/slides/slide18.xml><?xml version="1.0" encoding="utf-8"?>
+<p:sld xmlns:a="http://schemas.openxmlformats.org/drawingml/2006/main" xmlns:r="http://schemas.openxmlformats.org/officeDocument/2006/relationships" xmlns:p="http://schemas.openxmlformats.org/presentationml/2006/main">
+  <p:cSld>
+    <p:spTree>
+      <p:nvGrpSpPr>
+        <p:cNvPr id="1" name=""/>
+        <p:cNvGrpSpPr/>
+        <p:nvPr/>
+      </p:nvGrpSpPr>
+      <p:grpSpPr>
+        <a:xfrm>
+          <a:off x="0" y="0"/>
+          <a:ext cx="0" cy="0"/>
+          <a:chOff x="0" y="0"/>
+          <a:chExt cx="0" cy="0"/>
+        </a:xfrm>
+      </p:grpSpPr>
+      <p:sp>
+        <p:nvSpPr>
+          <p:cNvPr id="5" name="Title 4"/>
+          <p:cNvSpPr>
+            <a:spLocks noGrp="1"/>
+          </p:cNvSpPr>
+          <p:nvPr>
+            <p:ph type="title"/>
+          </p:nvPr>
+        </p:nvSpPr>
+        <p:spPr/>
+        <p:txBody>
+          <a:bodyPr/>
+          <a:lstStyle/>
+          <a:p>
+            <a:r>
+              <a:rPr lang="en-US" dirty="0"/>
+              <a:t>Demo </a:t>
+            </a:r>
+            <a:r>
+              <a:rPr lang="en-US" dirty="0" err="1"/>
+              <a:t>javascripts</a:t>
+            </a:r>
+            <a:endParaRPr lang="bg-BG" dirty="0"/>
+          </a:p>
+        </p:txBody>
+      </p:sp>
+      <p:sp>
+        <p:nvSpPr>
+          <p:cNvPr id="6" name="Text Placeholder 5"/>
+          <p:cNvSpPr>
+            <a:spLocks noGrp="1"/>
+          </p:cNvSpPr>
+          <p:nvPr>
+            <p:ph type="body" idx="1"/>
+          </p:nvPr>
+        </p:nvSpPr>
+        <p:spPr/>
+        <p:txBody>
+          <a:bodyPr/>
+          <a:lstStyle/>
+          <a:p>
+            <a:r>
+              <a:rPr lang="en-US" smtClean="0"/>
+              <a:t>ex2.0, ex2.1</a:t>
+            </a:r>
+            <a:endParaRPr lang="bg-BG" dirty="0"/>
+          </a:p>
+        </p:txBody>
+      </p:sp>
+    </p:spTree>
+    <p:extLst>
+      <p:ext uri="{BB962C8B-B14F-4D97-AF65-F5344CB8AC3E}">
+        <p14:creationId xmlns:p14="http://schemas.microsoft.com/office/powerpoint/2010/main" val="1587184532"/>
+      </p:ext>
+    </p:extLst>
+  </p:cSld>
+  <p:clrMapOvr>
+    <a:masterClrMapping/>
+  </p:clrMapOvr>
+</p:sld>
+</file>
+
+<file path=ppt/slides/slide19.xml><?xml version="1.0" encoding="utf-8"?>
 <p:sld xmlns:a="http://schemas.openxmlformats.org/drawingml/2006/main" xmlns:r="http://schemas.openxmlformats.org/officeDocument/2006/relationships" xmlns:p="http://schemas.openxmlformats.org/presentationml/2006/main">
   <p:cSld>
     <p:bg>
@@ -7206,684 +7412,6 @@
     <p:extLst>
       <p:ext uri="{BB962C8B-B14F-4D97-AF65-F5344CB8AC3E}">
         <p14:creationId xmlns:p14="http://schemas.microsoft.com/office/powerpoint/2010/main" val="1995977215"/>
-      </p:ext>
-    </p:extLst>
-  </p:cSld>
-  <p:clrMapOvr>
-    <a:masterClrMapping/>
-  </p:clrMapOvr>
-</p:sld>
-</file>
-
-<file path=ppt/slides/slide19.xml><?xml version="1.0" encoding="utf-8"?>
-<p:sld xmlns:a="http://schemas.openxmlformats.org/drawingml/2006/main" xmlns:r="http://schemas.openxmlformats.org/officeDocument/2006/relationships" xmlns:p="http://schemas.openxmlformats.org/presentationml/2006/main">
-  <p:cSld>
-    <p:spTree>
-      <p:nvGrpSpPr>
-        <p:cNvPr id="1" name=""/>
-        <p:cNvGrpSpPr/>
-        <p:nvPr/>
-      </p:nvGrpSpPr>
-      <p:grpSpPr>
-        <a:xfrm>
-          <a:off x="0" y="0"/>
-          <a:ext cx="0" cy="0"/>
-          <a:chOff x="0" y="0"/>
-          <a:chExt cx="0" cy="0"/>
-        </a:xfrm>
-      </p:grpSpPr>
-      <p:sp>
-        <p:nvSpPr>
-          <p:cNvPr id="11" name="Text Placeholder 10"/>
-          <p:cNvSpPr>
-            <a:spLocks noGrp="1"/>
-          </p:cNvSpPr>
-          <p:nvPr>
-            <p:ph type="body" sz="quarter" idx="13"/>
-          </p:nvPr>
-        </p:nvSpPr>
-        <p:spPr>
-          <a:xfrm>
-            <a:off x="734292" y="5234187"/>
-            <a:ext cx="5609358" cy="574962"/>
-          </a:xfrm>
-        </p:spPr>
-        <p:txBody>
-          <a:bodyPr>
-            <a:normAutofit/>
-          </a:bodyPr>
-          <a:lstStyle/>
-          <a:p>
-            <a:r>
-              <a:rPr lang="en-US" dirty="0"/>
-              <a:t>Module Pattern in </a:t>
-            </a:r>
-            <a:r>
-              <a:rPr lang="en-US" dirty="0" err="1"/>
-              <a:t>NodeJS</a:t>
-            </a:r>
-            <a:endParaRPr lang="bg-BG" dirty="0"/>
-          </a:p>
-        </p:txBody>
-      </p:sp>
-      <p:sp>
-        <p:nvSpPr>
-          <p:cNvPr id="4" name="Title 3"/>
-          <p:cNvSpPr>
-            <a:spLocks noGrp="1"/>
-          </p:cNvSpPr>
-          <p:nvPr>
-            <p:ph type="title"/>
-          </p:nvPr>
-        </p:nvSpPr>
-        <p:spPr/>
-        <p:txBody>
-          <a:bodyPr>
-            <a:normAutofit/>
-          </a:bodyPr>
-          <a:lstStyle/>
-          <a:p>
-            <a:r>
-              <a:rPr lang="en-US" sz="2400" dirty="0">
-                <a:solidFill>
-                  <a:srgbClr val="608B4E"/>
-                </a:solidFill>
-                <a:latin typeface="Consolas" panose="020B0609020204030204" pitchFamily="49" charset="0"/>
-              </a:rPr>
-              <a:t>//file </a:t>
-            </a:r>
-            <a:r>
-              <a:rPr lang="en-US" sz="2400" dirty="0">
-                <a:solidFill>
-                  <a:srgbClr val="CE9178"/>
-                </a:solidFill>
-                <a:latin typeface="Consolas" panose="020B0609020204030204" pitchFamily="49" charset="0"/>
-              </a:rPr>
-              <a:t>square.js</a:t>
-            </a:r>
-            <a:r>
-              <a:rPr lang="en-US" sz="2400" dirty="0">
-                <a:solidFill>
-                  <a:srgbClr val="4EC9B0"/>
-                </a:solidFill>
-                <a:latin typeface="Consolas" panose="020B0609020204030204" pitchFamily="49" charset="0"/>
-              </a:rPr>
-              <a:t/>
-            </a:r>
-            <a:br>
-              <a:rPr lang="en-US" sz="2400" dirty="0">
-                <a:solidFill>
-                  <a:srgbClr val="4EC9B0"/>
-                </a:solidFill>
-                <a:latin typeface="Consolas" panose="020B0609020204030204" pitchFamily="49" charset="0"/>
-              </a:rPr>
-            </a:br>
-            <a:r>
-              <a:rPr lang="en-US" sz="2400" dirty="0" err="1">
-                <a:solidFill>
-                  <a:srgbClr val="4EC9B0"/>
-                </a:solidFill>
-                <a:latin typeface="Consolas" panose="020B0609020204030204" pitchFamily="49" charset="0"/>
-              </a:rPr>
-              <a:t>module</a:t>
-            </a:r>
-            <a:r>
-              <a:rPr lang="en-US" sz="2400" dirty="0" err="1">
-                <a:solidFill>
-                  <a:srgbClr val="D4D4D4"/>
-                </a:solidFill>
-                <a:latin typeface="Consolas" panose="020B0609020204030204" pitchFamily="49" charset="0"/>
-              </a:rPr>
-              <a:t>.</a:t>
-            </a:r>
-            <a:r>
-              <a:rPr lang="en-US" sz="2400" dirty="0" err="1">
-                <a:solidFill>
-                  <a:srgbClr val="4EC9B0"/>
-                </a:solidFill>
-                <a:latin typeface="Consolas" panose="020B0609020204030204" pitchFamily="49" charset="0"/>
-              </a:rPr>
-              <a:t>exports</a:t>
-            </a:r>
-            <a:r>
-              <a:rPr lang="en-US" sz="2400" dirty="0">
-                <a:solidFill>
-                  <a:srgbClr val="D4D4D4"/>
-                </a:solidFill>
-                <a:latin typeface="Consolas" panose="020B0609020204030204" pitchFamily="49" charset="0"/>
-              </a:rPr>
-              <a:t> = (</a:t>
-            </a:r>
-            <a:r>
-              <a:rPr lang="en-US" sz="2400" dirty="0">
-                <a:solidFill>
-                  <a:srgbClr val="9CDCFE"/>
-                </a:solidFill>
-                <a:latin typeface="Consolas" panose="020B0609020204030204" pitchFamily="49" charset="0"/>
-              </a:rPr>
-              <a:t>width</a:t>
-            </a:r>
-            <a:r>
-              <a:rPr lang="en-US" sz="2400" dirty="0">
-                <a:solidFill>
-                  <a:srgbClr val="D4D4D4"/>
-                </a:solidFill>
-                <a:latin typeface="Consolas" panose="020B0609020204030204" pitchFamily="49" charset="0"/>
-              </a:rPr>
-              <a:t>) </a:t>
-            </a:r>
-            <a:r>
-              <a:rPr lang="en-US" sz="2400" dirty="0">
-                <a:solidFill>
-                  <a:srgbClr val="569CD6"/>
-                </a:solidFill>
-                <a:latin typeface="Consolas" panose="020B0609020204030204" pitchFamily="49" charset="0"/>
-              </a:rPr>
-              <a:t>=&gt;</a:t>
-            </a:r>
-            <a:r>
-              <a:rPr lang="en-US" sz="2400" dirty="0">
-                <a:solidFill>
-                  <a:srgbClr val="D4D4D4"/>
-                </a:solidFill>
-                <a:latin typeface="Consolas" panose="020B0609020204030204" pitchFamily="49" charset="0"/>
-              </a:rPr>
-              <a:t> {</a:t>
-            </a:r>
-            <a:br>
-              <a:rPr lang="en-US" sz="2400" dirty="0">
-                <a:solidFill>
-                  <a:srgbClr val="D4D4D4"/>
-                </a:solidFill>
-                <a:latin typeface="Consolas" panose="020B0609020204030204" pitchFamily="49" charset="0"/>
-              </a:rPr>
-            </a:br>
-            <a:r>
-              <a:rPr lang="en-US" sz="2400" dirty="0">
-                <a:solidFill>
-                  <a:srgbClr val="D4D4D4"/>
-                </a:solidFill>
-                <a:latin typeface="Consolas" panose="020B0609020204030204" pitchFamily="49" charset="0"/>
-              </a:rPr>
-              <a:t>  </a:t>
-            </a:r>
-            <a:r>
-              <a:rPr lang="en-US" sz="2400" dirty="0">
-                <a:solidFill>
-                  <a:srgbClr val="C586C0"/>
-                </a:solidFill>
-                <a:latin typeface="Consolas" panose="020B0609020204030204" pitchFamily="49" charset="0"/>
-              </a:rPr>
-              <a:t>return</a:t>
-            </a:r>
-            <a:r>
-              <a:rPr lang="en-US" sz="2400" dirty="0">
-                <a:solidFill>
-                  <a:srgbClr val="D4D4D4"/>
-                </a:solidFill>
-                <a:latin typeface="Consolas" panose="020B0609020204030204" pitchFamily="49" charset="0"/>
-              </a:rPr>
-              <a:t> {</a:t>
-            </a:r>
-            <a:br>
-              <a:rPr lang="en-US" sz="2400" dirty="0">
-                <a:solidFill>
-                  <a:srgbClr val="D4D4D4"/>
-                </a:solidFill>
-                <a:latin typeface="Consolas" panose="020B0609020204030204" pitchFamily="49" charset="0"/>
-              </a:rPr>
-            </a:br>
-            <a:r>
-              <a:rPr lang="en-US" sz="2400" dirty="0">
-                <a:solidFill>
-                  <a:srgbClr val="D4D4D4"/>
-                </a:solidFill>
-                <a:latin typeface="Consolas" panose="020B0609020204030204" pitchFamily="49" charset="0"/>
-              </a:rPr>
-              <a:t>    </a:t>
-            </a:r>
-            <a:r>
-              <a:rPr lang="en-US" sz="2400" dirty="0">
-                <a:solidFill>
-                  <a:srgbClr val="9CDCFE"/>
-                </a:solidFill>
-                <a:latin typeface="Consolas" panose="020B0609020204030204" pitchFamily="49" charset="0"/>
-              </a:rPr>
-              <a:t>area:</a:t>
-            </a:r>
-            <a:r>
-              <a:rPr lang="en-US" sz="2400" dirty="0">
-                <a:solidFill>
-                  <a:srgbClr val="D4D4D4"/>
-                </a:solidFill>
-                <a:latin typeface="Consolas" panose="020B0609020204030204" pitchFamily="49" charset="0"/>
-              </a:rPr>
-              <a:t> () </a:t>
-            </a:r>
-            <a:r>
-              <a:rPr lang="en-US" sz="2400" dirty="0">
-                <a:solidFill>
-                  <a:srgbClr val="569CD6"/>
-                </a:solidFill>
-                <a:latin typeface="Consolas" panose="020B0609020204030204" pitchFamily="49" charset="0"/>
-              </a:rPr>
-              <a:t>=&gt;</a:t>
-            </a:r>
-            <a:r>
-              <a:rPr lang="en-US" sz="2400" dirty="0">
-                <a:solidFill>
-                  <a:srgbClr val="D4D4D4"/>
-                </a:solidFill>
-                <a:latin typeface="Consolas" panose="020B0609020204030204" pitchFamily="49" charset="0"/>
-              </a:rPr>
-              <a:t> </a:t>
-            </a:r>
-            <a:r>
-              <a:rPr lang="en-US" sz="2400" dirty="0">
-                <a:solidFill>
-                  <a:srgbClr val="9CDCFE"/>
-                </a:solidFill>
-                <a:latin typeface="Consolas" panose="020B0609020204030204" pitchFamily="49" charset="0"/>
-              </a:rPr>
-              <a:t>width</a:t>
-            </a:r>
-            <a:r>
-              <a:rPr lang="en-US" sz="2400" dirty="0">
-                <a:solidFill>
-                  <a:srgbClr val="D4D4D4"/>
-                </a:solidFill>
-                <a:latin typeface="Consolas" panose="020B0609020204030204" pitchFamily="49" charset="0"/>
-              </a:rPr>
-              <a:t> * </a:t>
-            </a:r>
-            <a:r>
-              <a:rPr lang="en-US" sz="2400" dirty="0">
-                <a:solidFill>
-                  <a:srgbClr val="9CDCFE"/>
-                </a:solidFill>
-                <a:latin typeface="Consolas" panose="020B0609020204030204" pitchFamily="49" charset="0"/>
-              </a:rPr>
-              <a:t>width</a:t>
-            </a:r>
-            <a:r>
-              <a:rPr lang="en-US" sz="2400" dirty="0">
-                <a:solidFill>
-                  <a:srgbClr val="D4D4D4"/>
-                </a:solidFill>
-                <a:latin typeface="Consolas" panose="020B0609020204030204" pitchFamily="49" charset="0"/>
-              </a:rPr>
-              <a:t/>
-            </a:r>
-            <a:br>
-              <a:rPr lang="en-US" sz="2400" dirty="0">
-                <a:solidFill>
-                  <a:srgbClr val="D4D4D4"/>
-                </a:solidFill>
-                <a:latin typeface="Consolas" panose="020B0609020204030204" pitchFamily="49" charset="0"/>
-              </a:rPr>
-            </a:br>
-            <a:r>
-              <a:rPr lang="en-US" sz="2400" dirty="0">
-                <a:solidFill>
-                  <a:srgbClr val="D4D4D4"/>
-                </a:solidFill>
-                <a:latin typeface="Consolas" panose="020B0609020204030204" pitchFamily="49" charset="0"/>
-              </a:rPr>
-              <a:t>  };</a:t>
-            </a:r>
-            <a:br>
-              <a:rPr lang="en-US" sz="2400" dirty="0">
-                <a:solidFill>
-                  <a:srgbClr val="D4D4D4"/>
-                </a:solidFill>
-                <a:latin typeface="Consolas" panose="020B0609020204030204" pitchFamily="49" charset="0"/>
-              </a:rPr>
-            </a:br>
-            <a:r>
-              <a:rPr lang="en-US" sz="2400" dirty="0">
-                <a:solidFill>
-                  <a:srgbClr val="D4D4D4"/>
-                </a:solidFill>
-                <a:latin typeface="Consolas" panose="020B0609020204030204" pitchFamily="49" charset="0"/>
-              </a:rPr>
-              <a:t>}</a:t>
-            </a:r>
-            <a:br>
-              <a:rPr lang="en-US" sz="2400" dirty="0">
-                <a:solidFill>
-                  <a:srgbClr val="D4D4D4"/>
-                </a:solidFill>
-                <a:latin typeface="Consolas" panose="020B0609020204030204" pitchFamily="49" charset="0"/>
-              </a:rPr>
-            </a:br>
-            <a:r>
-              <a:rPr lang="en-US" sz="2400" dirty="0">
-                <a:solidFill>
-                  <a:srgbClr val="D4D4D4"/>
-                </a:solidFill>
-                <a:latin typeface="Consolas" panose="020B0609020204030204" pitchFamily="49" charset="0"/>
-              </a:rPr>
-              <a:t/>
-            </a:r>
-            <a:br>
-              <a:rPr lang="en-US" sz="2400" dirty="0">
-                <a:solidFill>
-                  <a:srgbClr val="D4D4D4"/>
-                </a:solidFill>
-                <a:latin typeface="Consolas" panose="020B0609020204030204" pitchFamily="49" charset="0"/>
-              </a:rPr>
-            </a:br>
-            <a:r>
-              <a:rPr lang="en-US" sz="2400" dirty="0">
-                <a:solidFill>
-                  <a:srgbClr val="608B4E"/>
-                </a:solidFill>
-                <a:latin typeface="Consolas" panose="020B0609020204030204" pitchFamily="49" charset="0"/>
-              </a:rPr>
-              <a:t>//</a:t>
-            </a:r>
-            <a:r>
-              <a:rPr lang="en-US" sz="2400">
-                <a:solidFill>
-                  <a:srgbClr val="608B4E"/>
-                </a:solidFill>
-                <a:latin typeface="Consolas" panose="020B0609020204030204" pitchFamily="49" charset="0"/>
-              </a:rPr>
-              <a:t>file </a:t>
-            </a:r>
-            <a:r>
-              <a:rPr lang="en-US" sz="2400">
-                <a:solidFill>
-                  <a:srgbClr val="CE9178"/>
-                </a:solidFill>
-                <a:latin typeface="Consolas" panose="020B0609020204030204" pitchFamily="49" charset="0"/>
-              </a:rPr>
-              <a:t>export.</a:t>
-            </a:r>
-            <a:r>
-              <a:rPr lang="en-US" sz="2400" dirty="0">
-                <a:solidFill>
-                  <a:srgbClr val="CE9178"/>
-                </a:solidFill>
-                <a:latin typeface="Consolas" panose="020B0609020204030204" pitchFamily="49" charset="0"/>
-              </a:rPr>
-              <a:t>js</a:t>
-            </a:r>
-            <a:r>
-              <a:rPr lang="en-US" sz="2400" dirty="0">
-                <a:solidFill>
-                  <a:srgbClr val="D4D4D4"/>
-                </a:solidFill>
-                <a:latin typeface="Consolas" panose="020B0609020204030204" pitchFamily="49" charset="0"/>
-              </a:rPr>
-              <a:t/>
-            </a:r>
-            <a:br>
-              <a:rPr lang="en-US" sz="2400" dirty="0">
-                <a:solidFill>
-                  <a:srgbClr val="D4D4D4"/>
-                </a:solidFill>
-                <a:latin typeface="Consolas" panose="020B0609020204030204" pitchFamily="49" charset="0"/>
-              </a:rPr>
-            </a:br>
-            <a:r>
-              <a:rPr lang="en-US" sz="2400" dirty="0" err="1">
-                <a:solidFill>
-                  <a:srgbClr val="569CD6"/>
-                </a:solidFill>
-                <a:latin typeface="Consolas" panose="020B0609020204030204" pitchFamily="49" charset="0"/>
-              </a:rPr>
-              <a:t>const</a:t>
-            </a:r>
-            <a:r>
-              <a:rPr lang="en-US" sz="2400" dirty="0">
-                <a:solidFill>
-                  <a:srgbClr val="D4D4D4"/>
-                </a:solidFill>
-                <a:latin typeface="Consolas" panose="020B0609020204030204" pitchFamily="49" charset="0"/>
-              </a:rPr>
-              <a:t> </a:t>
-            </a:r>
-            <a:r>
-              <a:rPr lang="en-US" sz="2400" dirty="0">
-                <a:solidFill>
-                  <a:srgbClr val="9CDCFE"/>
-                </a:solidFill>
-                <a:latin typeface="Consolas" panose="020B0609020204030204" pitchFamily="49" charset="0"/>
-              </a:rPr>
-              <a:t>square</a:t>
-            </a:r>
-            <a:r>
-              <a:rPr lang="en-US" sz="2400" dirty="0">
-                <a:solidFill>
-                  <a:srgbClr val="D4D4D4"/>
-                </a:solidFill>
-                <a:latin typeface="Consolas" panose="020B0609020204030204" pitchFamily="49" charset="0"/>
-              </a:rPr>
-              <a:t> = </a:t>
-            </a:r>
-            <a:r>
-              <a:rPr lang="en-US" sz="2400" dirty="0">
-                <a:solidFill>
-                  <a:srgbClr val="DCDCAA"/>
-                </a:solidFill>
-                <a:latin typeface="Consolas" panose="020B0609020204030204" pitchFamily="49" charset="0"/>
-              </a:rPr>
-              <a:t>require</a:t>
-            </a:r>
-            <a:r>
-              <a:rPr lang="en-US" sz="2400" dirty="0">
-                <a:solidFill>
-                  <a:srgbClr val="D4D4D4"/>
-                </a:solidFill>
-                <a:latin typeface="Consolas" panose="020B0609020204030204" pitchFamily="49" charset="0"/>
-              </a:rPr>
-              <a:t>(</a:t>
-            </a:r>
-            <a:r>
-              <a:rPr lang="en-US" sz="2400" dirty="0">
-                <a:solidFill>
-                  <a:srgbClr val="CE9178"/>
-                </a:solidFill>
-                <a:latin typeface="Consolas" panose="020B0609020204030204" pitchFamily="49" charset="0"/>
-              </a:rPr>
-              <a:t>'./square.js'</a:t>
-            </a:r>
-            <a:r>
-              <a:rPr lang="en-US" sz="2400" dirty="0">
-                <a:solidFill>
-                  <a:srgbClr val="D4D4D4"/>
-                </a:solidFill>
-                <a:latin typeface="Consolas" panose="020B0609020204030204" pitchFamily="49" charset="0"/>
-              </a:rPr>
-              <a:t>);</a:t>
-            </a:r>
-            <a:br>
-              <a:rPr lang="en-US" sz="2400" dirty="0">
-                <a:solidFill>
-                  <a:srgbClr val="D4D4D4"/>
-                </a:solidFill>
-                <a:latin typeface="Consolas" panose="020B0609020204030204" pitchFamily="49" charset="0"/>
-              </a:rPr>
-            </a:br>
-            <a:r>
-              <a:rPr lang="en-US" sz="2400" dirty="0" err="1">
-                <a:solidFill>
-                  <a:srgbClr val="569CD6"/>
-                </a:solidFill>
-                <a:latin typeface="Consolas" panose="020B0609020204030204" pitchFamily="49" charset="0"/>
-              </a:rPr>
-              <a:t>var</a:t>
-            </a:r>
-            <a:r>
-              <a:rPr lang="en-US" sz="2400" dirty="0">
-                <a:solidFill>
-                  <a:srgbClr val="D4D4D4"/>
-                </a:solidFill>
-                <a:latin typeface="Consolas" panose="020B0609020204030204" pitchFamily="49" charset="0"/>
-              </a:rPr>
-              <a:t> </a:t>
-            </a:r>
-            <a:r>
-              <a:rPr lang="en-US" sz="2400" dirty="0" err="1">
-                <a:solidFill>
-                  <a:srgbClr val="9CDCFE"/>
-                </a:solidFill>
-                <a:latin typeface="Consolas" panose="020B0609020204030204" pitchFamily="49" charset="0"/>
-              </a:rPr>
-              <a:t>mySquare</a:t>
-            </a:r>
-            <a:r>
-              <a:rPr lang="en-US" sz="2400" dirty="0">
-                <a:solidFill>
-                  <a:srgbClr val="D4D4D4"/>
-                </a:solidFill>
-                <a:latin typeface="Consolas" panose="020B0609020204030204" pitchFamily="49" charset="0"/>
-              </a:rPr>
-              <a:t> = </a:t>
-            </a:r>
-            <a:r>
-              <a:rPr lang="en-US" sz="2400" dirty="0">
-                <a:solidFill>
-                  <a:srgbClr val="DCDCAA"/>
-                </a:solidFill>
-                <a:latin typeface="Consolas" panose="020B0609020204030204" pitchFamily="49" charset="0"/>
-              </a:rPr>
-              <a:t>square</a:t>
-            </a:r>
-            <a:r>
-              <a:rPr lang="en-US" sz="2400" dirty="0">
-                <a:solidFill>
-                  <a:srgbClr val="D4D4D4"/>
-                </a:solidFill>
-                <a:latin typeface="Consolas" panose="020B0609020204030204" pitchFamily="49" charset="0"/>
-              </a:rPr>
-              <a:t>(</a:t>
-            </a:r>
-            <a:r>
-              <a:rPr lang="en-US" sz="2400" dirty="0">
-                <a:solidFill>
-                  <a:srgbClr val="B5CEA8"/>
-                </a:solidFill>
-                <a:latin typeface="Consolas" panose="020B0609020204030204" pitchFamily="49" charset="0"/>
-              </a:rPr>
-              <a:t>2</a:t>
-            </a:r>
-            <a:r>
-              <a:rPr lang="en-US" sz="2400" dirty="0">
-                <a:solidFill>
-                  <a:srgbClr val="D4D4D4"/>
-                </a:solidFill>
-                <a:latin typeface="Consolas" panose="020B0609020204030204" pitchFamily="49" charset="0"/>
-              </a:rPr>
-              <a:t>);</a:t>
-            </a:r>
-            <a:br>
-              <a:rPr lang="en-US" sz="2400" dirty="0">
-                <a:solidFill>
-                  <a:srgbClr val="D4D4D4"/>
-                </a:solidFill>
-                <a:latin typeface="Consolas" panose="020B0609020204030204" pitchFamily="49" charset="0"/>
-              </a:rPr>
-            </a:br>
-            <a:r>
-              <a:rPr lang="en-US" sz="2400" dirty="0">
-                <a:solidFill>
-                  <a:srgbClr val="4EC9B0"/>
-                </a:solidFill>
-                <a:latin typeface="Consolas" panose="020B0609020204030204" pitchFamily="49" charset="0"/>
-              </a:rPr>
-              <a:t>console</a:t>
-            </a:r>
-            <a:r>
-              <a:rPr lang="en-US" sz="2400" dirty="0">
-                <a:solidFill>
-                  <a:srgbClr val="D4D4D4"/>
-                </a:solidFill>
-                <a:latin typeface="Consolas" panose="020B0609020204030204" pitchFamily="49" charset="0"/>
-              </a:rPr>
-              <a:t>.</a:t>
-            </a:r>
-            <a:r>
-              <a:rPr lang="en-US" sz="2400" dirty="0">
-                <a:solidFill>
-                  <a:srgbClr val="DCDCAA"/>
-                </a:solidFill>
-                <a:latin typeface="Consolas" panose="020B0609020204030204" pitchFamily="49" charset="0"/>
-              </a:rPr>
-              <a:t>log</a:t>
-            </a:r>
-            <a:r>
-              <a:rPr lang="en-US" sz="2400" dirty="0">
-                <a:solidFill>
-                  <a:srgbClr val="D4D4D4"/>
-                </a:solidFill>
-                <a:latin typeface="Consolas" panose="020B0609020204030204" pitchFamily="49" charset="0"/>
-              </a:rPr>
-              <a:t>(</a:t>
-            </a:r>
-            <a:r>
-              <a:rPr lang="en-US" sz="2400" dirty="0">
-                <a:solidFill>
-                  <a:srgbClr val="CE9178"/>
-                </a:solidFill>
-                <a:latin typeface="Consolas" panose="020B0609020204030204" pitchFamily="49" charset="0"/>
-              </a:rPr>
-              <a:t>`The area of my square is ${</a:t>
-            </a:r>
-            <a:r>
-              <a:rPr lang="en-US" sz="2400" dirty="0" err="1">
-                <a:solidFill>
-                  <a:srgbClr val="9CDCFE"/>
-                </a:solidFill>
-                <a:latin typeface="Consolas" panose="020B0609020204030204" pitchFamily="49" charset="0"/>
-              </a:rPr>
-              <a:t>mySquare</a:t>
-            </a:r>
-            <a:r>
-              <a:rPr lang="en-US" sz="2400" dirty="0" err="1">
-                <a:solidFill>
-                  <a:srgbClr val="CE9178"/>
-                </a:solidFill>
-                <a:latin typeface="Consolas" panose="020B0609020204030204" pitchFamily="49" charset="0"/>
-              </a:rPr>
-              <a:t>.</a:t>
-            </a:r>
-            <a:r>
-              <a:rPr lang="en-US" sz="2400" dirty="0" err="1">
-                <a:solidFill>
-                  <a:srgbClr val="DCDCAA"/>
-                </a:solidFill>
-                <a:latin typeface="Consolas" panose="020B0609020204030204" pitchFamily="49" charset="0"/>
-              </a:rPr>
-              <a:t>area</a:t>
-            </a:r>
-            <a:r>
-              <a:rPr lang="en-US" sz="2400" dirty="0">
-                <a:solidFill>
-                  <a:srgbClr val="CE9178"/>
-                </a:solidFill>
-                <a:latin typeface="Consolas" panose="020B0609020204030204" pitchFamily="49" charset="0"/>
-              </a:rPr>
-              <a:t>()}`</a:t>
-            </a:r>
-            <a:r>
-              <a:rPr lang="en-US" sz="2400" dirty="0">
-                <a:solidFill>
-                  <a:srgbClr val="D4D4D4"/>
-                </a:solidFill>
-                <a:latin typeface="Consolas" panose="020B0609020204030204" pitchFamily="49" charset="0"/>
-              </a:rPr>
-              <a:t>);</a:t>
-            </a:r>
-            <a:endParaRPr lang="bg-BG" sz="2400" dirty="0"/>
-          </a:p>
-        </p:txBody>
-      </p:sp>
-    </p:spTree>
-    <p:extLst>
-      <p:ext uri="{BB962C8B-B14F-4D97-AF65-F5344CB8AC3E}">
-        <p14:creationId xmlns:p14="http://schemas.microsoft.com/office/powerpoint/2010/main" val="1619042804"/>
       </p:ext>
     </p:extLst>
   </p:cSld>
@@ -8195,6 +7723,684 @@
       </p:grpSpPr>
       <p:sp>
         <p:nvSpPr>
+          <p:cNvPr id="11" name="Text Placeholder 10"/>
+          <p:cNvSpPr>
+            <a:spLocks noGrp="1"/>
+          </p:cNvSpPr>
+          <p:nvPr>
+            <p:ph type="body" sz="quarter" idx="13"/>
+          </p:nvPr>
+        </p:nvSpPr>
+        <p:spPr>
+          <a:xfrm>
+            <a:off x="734292" y="5234187"/>
+            <a:ext cx="5609358" cy="574962"/>
+          </a:xfrm>
+        </p:spPr>
+        <p:txBody>
+          <a:bodyPr>
+            <a:normAutofit/>
+          </a:bodyPr>
+          <a:lstStyle/>
+          <a:p>
+            <a:r>
+              <a:rPr lang="en-US" dirty="0"/>
+              <a:t>Module Pattern in </a:t>
+            </a:r>
+            <a:r>
+              <a:rPr lang="en-US" dirty="0" err="1"/>
+              <a:t>NodeJS</a:t>
+            </a:r>
+            <a:endParaRPr lang="bg-BG" dirty="0"/>
+          </a:p>
+        </p:txBody>
+      </p:sp>
+      <p:sp>
+        <p:nvSpPr>
+          <p:cNvPr id="4" name="Title 3"/>
+          <p:cNvSpPr>
+            <a:spLocks noGrp="1"/>
+          </p:cNvSpPr>
+          <p:nvPr>
+            <p:ph type="title"/>
+          </p:nvPr>
+        </p:nvSpPr>
+        <p:spPr/>
+        <p:txBody>
+          <a:bodyPr>
+            <a:normAutofit/>
+          </a:bodyPr>
+          <a:lstStyle/>
+          <a:p>
+            <a:r>
+              <a:rPr lang="en-US" sz="2400" dirty="0">
+                <a:solidFill>
+                  <a:srgbClr val="608B4E"/>
+                </a:solidFill>
+                <a:latin typeface="Consolas" panose="020B0609020204030204" pitchFamily="49" charset="0"/>
+              </a:rPr>
+              <a:t>//file </a:t>
+            </a:r>
+            <a:r>
+              <a:rPr lang="en-US" sz="2400" dirty="0">
+                <a:solidFill>
+                  <a:srgbClr val="CE9178"/>
+                </a:solidFill>
+                <a:latin typeface="Consolas" panose="020B0609020204030204" pitchFamily="49" charset="0"/>
+              </a:rPr>
+              <a:t>square.js</a:t>
+            </a:r>
+            <a:r>
+              <a:rPr lang="en-US" sz="2400" dirty="0">
+                <a:solidFill>
+                  <a:srgbClr val="4EC9B0"/>
+                </a:solidFill>
+                <a:latin typeface="Consolas" panose="020B0609020204030204" pitchFamily="49" charset="0"/>
+              </a:rPr>
+              <a:t/>
+            </a:r>
+            <a:br>
+              <a:rPr lang="en-US" sz="2400" dirty="0">
+                <a:solidFill>
+                  <a:srgbClr val="4EC9B0"/>
+                </a:solidFill>
+                <a:latin typeface="Consolas" panose="020B0609020204030204" pitchFamily="49" charset="0"/>
+              </a:rPr>
+            </a:br>
+            <a:r>
+              <a:rPr lang="en-US" sz="2400" dirty="0" err="1">
+                <a:solidFill>
+                  <a:srgbClr val="4EC9B0"/>
+                </a:solidFill>
+                <a:latin typeface="Consolas" panose="020B0609020204030204" pitchFamily="49" charset="0"/>
+              </a:rPr>
+              <a:t>module</a:t>
+            </a:r>
+            <a:r>
+              <a:rPr lang="en-US" sz="2400" dirty="0" err="1">
+                <a:solidFill>
+                  <a:srgbClr val="D4D4D4"/>
+                </a:solidFill>
+                <a:latin typeface="Consolas" panose="020B0609020204030204" pitchFamily="49" charset="0"/>
+              </a:rPr>
+              <a:t>.</a:t>
+            </a:r>
+            <a:r>
+              <a:rPr lang="en-US" sz="2400" dirty="0" err="1">
+                <a:solidFill>
+                  <a:srgbClr val="4EC9B0"/>
+                </a:solidFill>
+                <a:latin typeface="Consolas" panose="020B0609020204030204" pitchFamily="49" charset="0"/>
+              </a:rPr>
+              <a:t>exports</a:t>
+            </a:r>
+            <a:r>
+              <a:rPr lang="en-US" sz="2400" dirty="0">
+                <a:solidFill>
+                  <a:srgbClr val="D4D4D4"/>
+                </a:solidFill>
+                <a:latin typeface="Consolas" panose="020B0609020204030204" pitchFamily="49" charset="0"/>
+              </a:rPr>
+              <a:t> = (</a:t>
+            </a:r>
+            <a:r>
+              <a:rPr lang="en-US" sz="2400" dirty="0">
+                <a:solidFill>
+                  <a:srgbClr val="9CDCFE"/>
+                </a:solidFill>
+                <a:latin typeface="Consolas" panose="020B0609020204030204" pitchFamily="49" charset="0"/>
+              </a:rPr>
+              <a:t>width</a:t>
+            </a:r>
+            <a:r>
+              <a:rPr lang="en-US" sz="2400" dirty="0">
+                <a:solidFill>
+                  <a:srgbClr val="D4D4D4"/>
+                </a:solidFill>
+                <a:latin typeface="Consolas" panose="020B0609020204030204" pitchFamily="49" charset="0"/>
+              </a:rPr>
+              <a:t>) </a:t>
+            </a:r>
+            <a:r>
+              <a:rPr lang="en-US" sz="2400" dirty="0">
+                <a:solidFill>
+                  <a:srgbClr val="569CD6"/>
+                </a:solidFill>
+                <a:latin typeface="Consolas" panose="020B0609020204030204" pitchFamily="49" charset="0"/>
+              </a:rPr>
+              <a:t>=&gt;</a:t>
+            </a:r>
+            <a:r>
+              <a:rPr lang="en-US" sz="2400" dirty="0">
+                <a:solidFill>
+                  <a:srgbClr val="D4D4D4"/>
+                </a:solidFill>
+                <a:latin typeface="Consolas" panose="020B0609020204030204" pitchFamily="49" charset="0"/>
+              </a:rPr>
+              <a:t> {</a:t>
+            </a:r>
+            <a:br>
+              <a:rPr lang="en-US" sz="2400" dirty="0">
+                <a:solidFill>
+                  <a:srgbClr val="D4D4D4"/>
+                </a:solidFill>
+                <a:latin typeface="Consolas" panose="020B0609020204030204" pitchFamily="49" charset="0"/>
+              </a:rPr>
+            </a:br>
+            <a:r>
+              <a:rPr lang="en-US" sz="2400" dirty="0">
+                <a:solidFill>
+                  <a:srgbClr val="D4D4D4"/>
+                </a:solidFill>
+                <a:latin typeface="Consolas" panose="020B0609020204030204" pitchFamily="49" charset="0"/>
+              </a:rPr>
+              <a:t>  </a:t>
+            </a:r>
+            <a:r>
+              <a:rPr lang="en-US" sz="2400" dirty="0">
+                <a:solidFill>
+                  <a:srgbClr val="C586C0"/>
+                </a:solidFill>
+                <a:latin typeface="Consolas" panose="020B0609020204030204" pitchFamily="49" charset="0"/>
+              </a:rPr>
+              <a:t>return</a:t>
+            </a:r>
+            <a:r>
+              <a:rPr lang="en-US" sz="2400" dirty="0">
+                <a:solidFill>
+                  <a:srgbClr val="D4D4D4"/>
+                </a:solidFill>
+                <a:latin typeface="Consolas" panose="020B0609020204030204" pitchFamily="49" charset="0"/>
+              </a:rPr>
+              <a:t> {</a:t>
+            </a:r>
+            <a:br>
+              <a:rPr lang="en-US" sz="2400" dirty="0">
+                <a:solidFill>
+                  <a:srgbClr val="D4D4D4"/>
+                </a:solidFill>
+                <a:latin typeface="Consolas" panose="020B0609020204030204" pitchFamily="49" charset="0"/>
+              </a:rPr>
+            </a:br>
+            <a:r>
+              <a:rPr lang="en-US" sz="2400" dirty="0">
+                <a:solidFill>
+                  <a:srgbClr val="D4D4D4"/>
+                </a:solidFill>
+                <a:latin typeface="Consolas" panose="020B0609020204030204" pitchFamily="49" charset="0"/>
+              </a:rPr>
+              <a:t>    </a:t>
+            </a:r>
+            <a:r>
+              <a:rPr lang="en-US" sz="2400" dirty="0">
+                <a:solidFill>
+                  <a:srgbClr val="9CDCFE"/>
+                </a:solidFill>
+                <a:latin typeface="Consolas" panose="020B0609020204030204" pitchFamily="49" charset="0"/>
+              </a:rPr>
+              <a:t>area:</a:t>
+            </a:r>
+            <a:r>
+              <a:rPr lang="en-US" sz="2400" dirty="0">
+                <a:solidFill>
+                  <a:srgbClr val="D4D4D4"/>
+                </a:solidFill>
+                <a:latin typeface="Consolas" panose="020B0609020204030204" pitchFamily="49" charset="0"/>
+              </a:rPr>
+              <a:t> () </a:t>
+            </a:r>
+            <a:r>
+              <a:rPr lang="en-US" sz="2400" dirty="0">
+                <a:solidFill>
+                  <a:srgbClr val="569CD6"/>
+                </a:solidFill>
+                <a:latin typeface="Consolas" panose="020B0609020204030204" pitchFamily="49" charset="0"/>
+              </a:rPr>
+              <a:t>=&gt;</a:t>
+            </a:r>
+            <a:r>
+              <a:rPr lang="en-US" sz="2400" dirty="0">
+                <a:solidFill>
+                  <a:srgbClr val="D4D4D4"/>
+                </a:solidFill>
+                <a:latin typeface="Consolas" panose="020B0609020204030204" pitchFamily="49" charset="0"/>
+              </a:rPr>
+              <a:t> </a:t>
+            </a:r>
+            <a:r>
+              <a:rPr lang="en-US" sz="2400" dirty="0">
+                <a:solidFill>
+                  <a:srgbClr val="9CDCFE"/>
+                </a:solidFill>
+                <a:latin typeface="Consolas" panose="020B0609020204030204" pitchFamily="49" charset="0"/>
+              </a:rPr>
+              <a:t>width</a:t>
+            </a:r>
+            <a:r>
+              <a:rPr lang="en-US" sz="2400" dirty="0">
+                <a:solidFill>
+                  <a:srgbClr val="D4D4D4"/>
+                </a:solidFill>
+                <a:latin typeface="Consolas" panose="020B0609020204030204" pitchFamily="49" charset="0"/>
+              </a:rPr>
+              <a:t> * </a:t>
+            </a:r>
+            <a:r>
+              <a:rPr lang="en-US" sz="2400" dirty="0">
+                <a:solidFill>
+                  <a:srgbClr val="9CDCFE"/>
+                </a:solidFill>
+                <a:latin typeface="Consolas" panose="020B0609020204030204" pitchFamily="49" charset="0"/>
+              </a:rPr>
+              <a:t>width</a:t>
+            </a:r>
+            <a:r>
+              <a:rPr lang="en-US" sz="2400" dirty="0">
+                <a:solidFill>
+                  <a:srgbClr val="D4D4D4"/>
+                </a:solidFill>
+                <a:latin typeface="Consolas" panose="020B0609020204030204" pitchFamily="49" charset="0"/>
+              </a:rPr>
+              <a:t/>
+            </a:r>
+            <a:br>
+              <a:rPr lang="en-US" sz="2400" dirty="0">
+                <a:solidFill>
+                  <a:srgbClr val="D4D4D4"/>
+                </a:solidFill>
+                <a:latin typeface="Consolas" panose="020B0609020204030204" pitchFamily="49" charset="0"/>
+              </a:rPr>
+            </a:br>
+            <a:r>
+              <a:rPr lang="en-US" sz="2400" dirty="0">
+                <a:solidFill>
+                  <a:srgbClr val="D4D4D4"/>
+                </a:solidFill>
+                <a:latin typeface="Consolas" panose="020B0609020204030204" pitchFamily="49" charset="0"/>
+              </a:rPr>
+              <a:t>  };</a:t>
+            </a:r>
+            <a:br>
+              <a:rPr lang="en-US" sz="2400" dirty="0">
+                <a:solidFill>
+                  <a:srgbClr val="D4D4D4"/>
+                </a:solidFill>
+                <a:latin typeface="Consolas" panose="020B0609020204030204" pitchFamily="49" charset="0"/>
+              </a:rPr>
+            </a:br>
+            <a:r>
+              <a:rPr lang="en-US" sz="2400" dirty="0">
+                <a:solidFill>
+                  <a:srgbClr val="D4D4D4"/>
+                </a:solidFill>
+                <a:latin typeface="Consolas" panose="020B0609020204030204" pitchFamily="49" charset="0"/>
+              </a:rPr>
+              <a:t>}</a:t>
+            </a:r>
+            <a:br>
+              <a:rPr lang="en-US" sz="2400" dirty="0">
+                <a:solidFill>
+                  <a:srgbClr val="D4D4D4"/>
+                </a:solidFill>
+                <a:latin typeface="Consolas" panose="020B0609020204030204" pitchFamily="49" charset="0"/>
+              </a:rPr>
+            </a:br>
+            <a:r>
+              <a:rPr lang="en-US" sz="2400" dirty="0">
+                <a:solidFill>
+                  <a:srgbClr val="D4D4D4"/>
+                </a:solidFill>
+                <a:latin typeface="Consolas" panose="020B0609020204030204" pitchFamily="49" charset="0"/>
+              </a:rPr>
+              <a:t/>
+            </a:r>
+            <a:br>
+              <a:rPr lang="en-US" sz="2400" dirty="0">
+                <a:solidFill>
+                  <a:srgbClr val="D4D4D4"/>
+                </a:solidFill>
+                <a:latin typeface="Consolas" panose="020B0609020204030204" pitchFamily="49" charset="0"/>
+              </a:rPr>
+            </a:br>
+            <a:r>
+              <a:rPr lang="en-US" sz="2400" dirty="0">
+                <a:solidFill>
+                  <a:srgbClr val="608B4E"/>
+                </a:solidFill>
+                <a:latin typeface="Consolas" panose="020B0609020204030204" pitchFamily="49" charset="0"/>
+              </a:rPr>
+              <a:t>//</a:t>
+            </a:r>
+            <a:r>
+              <a:rPr lang="en-US" sz="2400">
+                <a:solidFill>
+                  <a:srgbClr val="608B4E"/>
+                </a:solidFill>
+                <a:latin typeface="Consolas" panose="020B0609020204030204" pitchFamily="49" charset="0"/>
+              </a:rPr>
+              <a:t>file </a:t>
+            </a:r>
+            <a:r>
+              <a:rPr lang="en-US" sz="2400">
+                <a:solidFill>
+                  <a:srgbClr val="CE9178"/>
+                </a:solidFill>
+                <a:latin typeface="Consolas" panose="020B0609020204030204" pitchFamily="49" charset="0"/>
+              </a:rPr>
+              <a:t>export.</a:t>
+            </a:r>
+            <a:r>
+              <a:rPr lang="en-US" sz="2400" dirty="0">
+                <a:solidFill>
+                  <a:srgbClr val="CE9178"/>
+                </a:solidFill>
+                <a:latin typeface="Consolas" panose="020B0609020204030204" pitchFamily="49" charset="0"/>
+              </a:rPr>
+              <a:t>js</a:t>
+            </a:r>
+            <a:r>
+              <a:rPr lang="en-US" sz="2400" dirty="0">
+                <a:solidFill>
+                  <a:srgbClr val="D4D4D4"/>
+                </a:solidFill>
+                <a:latin typeface="Consolas" panose="020B0609020204030204" pitchFamily="49" charset="0"/>
+              </a:rPr>
+              <a:t/>
+            </a:r>
+            <a:br>
+              <a:rPr lang="en-US" sz="2400" dirty="0">
+                <a:solidFill>
+                  <a:srgbClr val="D4D4D4"/>
+                </a:solidFill>
+                <a:latin typeface="Consolas" panose="020B0609020204030204" pitchFamily="49" charset="0"/>
+              </a:rPr>
+            </a:br>
+            <a:r>
+              <a:rPr lang="en-US" sz="2400" dirty="0" err="1">
+                <a:solidFill>
+                  <a:srgbClr val="569CD6"/>
+                </a:solidFill>
+                <a:latin typeface="Consolas" panose="020B0609020204030204" pitchFamily="49" charset="0"/>
+              </a:rPr>
+              <a:t>const</a:t>
+            </a:r>
+            <a:r>
+              <a:rPr lang="en-US" sz="2400" dirty="0">
+                <a:solidFill>
+                  <a:srgbClr val="D4D4D4"/>
+                </a:solidFill>
+                <a:latin typeface="Consolas" panose="020B0609020204030204" pitchFamily="49" charset="0"/>
+              </a:rPr>
+              <a:t> </a:t>
+            </a:r>
+            <a:r>
+              <a:rPr lang="en-US" sz="2400" dirty="0">
+                <a:solidFill>
+                  <a:srgbClr val="9CDCFE"/>
+                </a:solidFill>
+                <a:latin typeface="Consolas" panose="020B0609020204030204" pitchFamily="49" charset="0"/>
+              </a:rPr>
+              <a:t>square</a:t>
+            </a:r>
+            <a:r>
+              <a:rPr lang="en-US" sz="2400" dirty="0">
+                <a:solidFill>
+                  <a:srgbClr val="D4D4D4"/>
+                </a:solidFill>
+                <a:latin typeface="Consolas" panose="020B0609020204030204" pitchFamily="49" charset="0"/>
+              </a:rPr>
+              <a:t> = </a:t>
+            </a:r>
+            <a:r>
+              <a:rPr lang="en-US" sz="2400" dirty="0">
+                <a:solidFill>
+                  <a:srgbClr val="DCDCAA"/>
+                </a:solidFill>
+                <a:latin typeface="Consolas" panose="020B0609020204030204" pitchFamily="49" charset="0"/>
+              </a:rPr>
+              <a:t>require</a:t>
+            </a:r>
+            <a:r>
+              <a:rPr lang="en-US" sz="2400" dirty="0">
+                <a:solidFill>
+                  <a:srgbClr val="D4D4D4"/>
+                </a:solidFill>
+                <a:latin typeface="Consolas" panose="020B0609020204030204" pitchFamily="49" charset="0"/>
+              </a:rPr>
+              <a:t>(</a:t>
+            </a:r>
+            <a:r>
+              <a:rPr lang="en-US" sz="2400" dirty="0">
+                <a:solidFill>
+                  <a:srgbClr val="CE9178"/>
+                </a:solidFill>
+                <a:latin typeface="Consolas" panose="020B0609020204030204" pitchFamily="49" charset="0"/>
+              </a:rPr>
+              <a:t>'./square.js'</a:t>
+            </a:r>
+            <a:r>
+              <a:rPr lang="en-US" sz="2400" dirty="0">
+                <a:solidFill>
+                  <a:srgbClr val="D4D4D4"/>
+                </a:solidFill>
+                <a:latin typeface="Consolas" panose="020B0609020204030204" pitchFamily="49" charset="0"/>
+              </a:rPr>
+              <a:t>);</a:t>
+            </a:r>
+            <a:br>
+              <a:rPr lang="en-US" sz="2400" dirty="0">
+                <a:solidFill>
+                  <a:srgbClr val="D4D4D4"/>
+                </a:solidFill>
+                <a:latin typeface="Consolas" panose="020B0609020204030204" pitchFamily="49" charset="0"/>
+              </a:rPr>
+            </a:br>
+            <a:r>
+              <a:rPr lang="en-US" sz="2400" dirty="0" err="1">
+                <a:solidFill>
+                  <a:srgbClr val="569CD6"/>
+                </a:solidFill>
+                <a:latin typeface="Consolas" panose="020B0609020204030204" pitchFamily="49" charset="0"/>
+              </a:rPr>
+              <a:t>var</a:t>
+            </a:r>
+            <a:r>
+              <a:rPr lang="en-US" sz="2400" dirty="0">
+                <a:solidFill>
+                  <a:srgbClr val="D4D4D4"/>
+                </a:solidFill>
+                <a:latin typeface="Consolas" panose="020B0609020204030204" pitchFamily="49" charset="0"/>
+              </a:rPr>
+              <a:t> </a:t>
+            </a:r>
+            <a:r>
+              <a:rPr lang="en-US" sz="2400" dirty="0" err="1">
+                <a:solidFill>
+                  <a:srgbClr val="9CDCFE"/>
+                </a:solidFill>
+                <a:latin typeface="Consolas" panose="020B0609020204030204" pitchFamily="49" charset="0"/>
+              </a:rPr>
+              <a:t>mySquare</a:t>
+            </a:r>
+            <a:r>
+              <a:rPr lang="en-US" sz="2400" dirty="0">
+                <a:solidFill>
+                  <a:srgbClr val="D4D4D4"/>
+                </a:solidFill>
+                <a:latin typeface="Consolas" panose="020B0609020204030204" pitchFamily="49" charset="0"/>
+              </a:rPr>
+              <a:t> = </a:t>
+            </a:r>
+            <a:r>
+              <a:rPr lang="en-US" sz="2400" dirty="0">
+                <a:solidFill>
+                  <a:srgbClr val="DCDCAA"/>
+                </a:solidFill>
+                <a:latin typeface="Consolas" panose="020B0609020204030204" pitchFamily="49" charset="0"/>
+              </a:rPr>
+              <a:t>square</a:t>
+            </a:r>
+            <a:r>
+              <a:rPr lang="en-US" sz="2400" dirty="0">
+                <a:solidFill>
+                  <a:srgbClr val="D4D4D4"/>
+                </a:solidFill>
+                <a:latin typeface="Consolas" panose="020B0609020204030204" pitchFamily="49" charset="0"/>
+              </a:rPr>
+              <a:t>(</a:t>
+            </a:r>
+            <a:r>
+              <a:rPr lang="en-US" sz="2400" dirty="0">
+                <a:solidFill>
+                  <a:srgbClr val="B5CEA8"/>
+                </a:solidFill>
+                <a:latin typeface="Consolas" panose="020B0609020204030204" pitchFamily="49" charset="0"/>
+              </a:rPr>
+              <a:t>2</a:t>
+            </a:r>
+            <a:r>
+              <a:rPr lang="en-US" sz="2400" dirty="0">
+                <a:solidFill>
+                  <a:srgbClr val="D4D4D4"/>
+                </a:solidFill>
+                <a:latin typeface="Consolas" panose="020B0609020204030204" pitchFamily="49" charset="0"/>
+              </a:rPr>
+              <a:t>);</a:t>
+            </a:r>
+            <a:br>
+              <a:rPr lang="en-US" sz="2400" dirty="0">
+                <a:solidFill>
+                  <a:srgbClr val="D4D4D4"/>
+                </a:solidFill>
+                <a:latin typeface="Consolas" panose="020B0609020204030204" pitchFamily="49" charset="0"/>
+              </a:rPr>
+            </a:br>
+            <a:r>
+              <a:rPr lang="en-US" sz="2400" dirty="0">
+                <a:solidFill>
+                  <a:srgbClr val="4EC9B0"/>
+                </a:solidFill>
+                <a:latin typeface="Consolas" panose="020B0609020204030204" pitchFamily="49" charset="0"/>
+              </a:rPr>
+              <a:t>console</a:t>
+            </a:r>
+            <a:r>
+              <a:rPr lang="en-US" sz="2400" dirty="0">
+                <a:solidFill>
+                  <a:srgbClr val="D4D4D4"/>
+                </a:solidFill>
+                <a:latin typeface="Consolas" panose="020B0609020204030204" pitchFamily="49" charset="0"/>
+              </a:rPr>
+              <a:t>.</a:t>
+            </a:r>
+            <a:r>
+              <a:rPr lang="en-US" sz="2400" dirty="0">
+                <a:solidFill>
+                  <a:srgbClr val="DCDCAA"/>
+                </a:solidFill>
+                <a:latin typeface="Consolas" panose="020B0609020204030204" pitchFamily="49" charset="0"/>
+              </a:rPr>
+              <a:t>log</a:t>
+            </a:r>
+            <a:r>
+              <a:rPr lang="en-US" sz="2400" dirty="0">
+                <a:solidFill>
+                  <a:srgbClr val="D4D4D4"/>
+                </a:solidFill>
+                <a:latin typeface="Consolas" panose="020B0609020204030204" pitchFamily="49" charset="0"/>
+              </a:rPr>
+              <a:t>(</a:t>
+            </a:r>
+            <a:r>
+              <a:rPr lang="en-US" sz="2400" dirty="0">
+                <a:solidFill>
+                  <a:srgbClr val="CE9178"/>
+                </a:solidFill>
+                <a:latin typeface="Consolas" panose="020B0609020204030204" pitchFamily="49" charset="0"/>
+              </a:rPr>
+              <a:t>`The area of my square is ${</a:t>
+            </a:r>
+            <a:r>
+              <a:rPr lang="en-US" sz="2400" dirty="0" err="1">
+                <a:solidFill>
+                  <a:srgbClr val="9CDCFE"/>
+                </a:solidFill>
+                <a:latin typeface="Consolas" panose="020B0609020204030204" pitchFamily="49" charset="0"/>
+              </a:rPr>
+              <a:t>mySquare</a:t>
+            </a:r>
+            <a:r>
+              <a:rPr lang="en-US" sz="2400" dirty="0" err="1">
+                <a:solidFill>
+                  <a:srgbClr val="CE9178"/>
+                </a:solidFill>
+                <a:latin typeface="Consolas" panose="020B0609020204030204" pitchFamily="49" charset="0"/>
+              </a:rPr>
+              <a:t>.</a:t>
+            </a:r>
+            <a:r>
+              <a:rPr lang="en-US" sz="2400" dirty="0" err="1">
+                <a:solidFill>
+                  <a:srgbClr val="DCDCAA"/>
+                </a:solidFill>
+                <a:latin typeface="Consolas" panose="020B0609020204030204" pitchFamily="49" charset="0"/>
+              </a:rPr>
+              <a:t>area</a:t>
+            </a:r>
+            <a:r>
+              <a:rPr lang="en-US" sz="2400" dirty="0">
+                <a:solidFill>
+                  <a:srgbClr val="CE9178"/>
+                </a:solidFill>
+                <a:latin typeface="Consolas" panose="020B0609020204030204" pitchFamily="49" charset="0"/>
+              </a:rPr>
+              <a:t>()}`</a:t>
+            </a:r>
+            <a:r>
+              <a:rPr lang="en-US" sz="2400" dirty="0">
+                <a:solidFill>
+                  <a:srgbClr val="D4D4D4"/>
+                </a:solidFill>
+                <a:latin typeface="Consolas" panose="020B0609020204030204" pitchFamily="49" charset="0"/>
+              </a:rPr>
+              <a:t>);</a:t>
+            </a:r>
+            <a:endParaRPr lang="bg-BG" sz="2400" dirty="0"/>
+          </a:p>
+        </p:txBody>
+      </p:sp>
+    </p:spTree>
+    <p:extLst>
+      <p:ext uri="{BB962C8B-B14F-4D97-AF65-F5344CB8AC3E}">
+        <p14:creationId xmlns:p14="http://schemas.microsoft.com/office/powerpoint/2010/main" val="1619042804"/>
+      </p:ext>
+    </p:extLst>
+  </p:cSld>
+  <p:clrMapOvr>
+    <a:masterClrMapping/>
+  </p:clrMapOvr>
+</p:sld>
+</file>
+
+<file path=ppt/slides/slide21.xml><?xml version="1.0" encoding="utf-8"?>
+<p:sld xmlns:a="http://schemas.openxmlformats.org/drawingml/2006/main" xmlns:r="http://schemas.openxmlformats.org/officeDocument/2006/relationships" xmlns:p="http://schemas.openxmlformats.org/presentationml/2006/main">
+  <p:cSld>
+    <p:spTree>
+      <p:nvGrpSpPr>
+        <p:cNvPr id="1" name=""/>
+        <p:cNvGrpSpPr/>
+        <p:nvPr/>
+      </p:nvGrpSpPr>
+      <p:grpSpPr>
+        <a:xfrm>
+          <a:off x="0" y="0"/>
+          <a:ext cx="0" cy="0"/>
+          <a:chOff x="0" y="0"/>
+          <a:chExt cx="0" cy="0"/>
+        </a:xfrm>
+      </p:grpSpPr>
+      <p:sp>
+        <p:nvSpPr>
           <p:cNvPr id="5" name="Title 4"/>
           <p:cNvSpPr>
             <a:spLocks noGrp="1"/>
@@ -8260,7 +8466,7 @@
 </p:sld>
 </file>
 
-<file path=ppt/slides/slide21.xml><?xml version="1.0" encoding="utf-8"?>
+<file path=ppt/slides/slide22.xml><?xml version="1.0" encoding="utf-8"?>
 <p:sld xmlns:a="http://schemas.openxmlformats.org/drawingml/2006/main" xmlns:r="http://schemas.openxmlformats.org/officeDocument/2006/relationships" xmlns:p="http://schemas.openxmlformats.org/presentationml/2006/main">
   <p:cSld>
     <p:bg>
@@ -8348,141 +8554,6 @@
     <p:extLst>
       <p:ext uri="{BB962C8B-B14F-4D97-AF65-F5344CB8AC3E}">
         <p14:creationId xmlns:p14="http://schemas.microsoft.com/office/powerpoint/2010/main" val="3825447161"/>
-      </p:ext>
-    </p:extLst>
-  </p:cSld>
-  <p:clrMapOvr>
-    <a:masterClrMapping/>
-  </p:clrMapOvr>
-</p:sld>
-</file>
-
-<file path=ppt/slides/slide22.xml><?xml version="1.0" encoding="utf-8"?>
-<p:sld xmlns:a="http://schemas.openxmlformats.org/drawingml/2006/main" xmlns:r="http://schemas.openxmlformats.org/officeDocument/2006/relationships" xmlns:p="http://schemas.openxmlformats.org/presentationml/2006/main">
-  <p:cSld>
-    <p:spTree>
-      <p:nvGrpSpPr>
-        <p:cNvPr id="1" name=""/>
-        <p:cNvGrpSpPr/>
-        <p:nvPr/>
-      </p:nvGrpSpPr>
-      <p:grpSpPr>
-        <a:xfrm>
-          <a:off x="0" y="0"/>
-          <a:ext cx="0" cy="0"/>
-          <a:chOff x="0" y="0"/>
-          <a:chExt cx="0" cy="0"/>
-        </a:xfrm>
-      </p:grpSpPr>
-      <p:sp>
-        <p:nvSpPr>
-          <p:cNvPr id="2" name="Title 1"/>
-          <p:cNvSpPr>
-            <a:spLocks noGrp="1"/>
-          </p:cNvSpPr>
-          <p:nvPr>
-            <p:ph type="title"/>
-          </p:nvPr>
-        </p:nvSpPr>
-        <p:spPr/>
-        <p:txBody>
-          <a:bodyPr>
-            <a:normAutofit/>
-          </a:bodyPr>
-          <a:lstStyle/>
-          <a:p>
-            <a:r>
-              <a:rPr lang="en-US" b="1" u="sng" dirty="0">
-                <a:solidFill>
-                  <a:schemeClr val="tx1"/>
-                </a:solidFill>
-              </a:rPr>
-              <a:t>NPM console</a:t>
-            </a:r>
-            <a:endParaRPr lang="bg-BG" b="1" u="sng" dirty="0">
-              <a:solidFill>
-                <a:schemeClr val="tx1"/>
-              </a:solidFill>
-            </a:endParaRPr>
-          </a:p>
-        </p:txBody>
-      </p:sp>
-      <p:sp>
-        <p:nvSpPr>
-          <p:cNvPr id="5" name="Content Placeholder 4"/>
-          <p:cNvSpPr>
-            <a:spLocks noGrp="1"/>
-          </p:cNvSpPr>
-          <p:nvPr>
-            <p:ph idx="1"/>
-          </p:nvPr>
-        </p:nvSpPr>
-        <p:spPr/>
-        <p:txBody>
-          <a:bodyPr>
-            <a:noAutofit/>
-          </a:bodyPr>
-          <a:lstStyle/>
-          <a:p>
-            <a:r>
-              <a:rPr lang="en-GB" sz="3200" dirty="0" err="1"/>
-              <a:t>npm</a:t>
-            </a:r>
-            <a:r>
-              <a:rPr lang="en-GB" sz="3200" dirty="0"/>
-              <a:t> </a:t>
-            </a:r>
-            <a:r>
-              <a:rPr lang="en-GB" sz="3200" dirty="0" err="1"/>
-              <a:t>init</a:t>
-            </a:r>
-            <a:endParaRPr lang="en-GB" sz="3200" dirty="0"/>
-          </a:p>
-          <a:p>
-            <a:r>
-              <a:rPr lang="en-GB" sz="3200" dirty="0" err="1"/>
-              <a:t>npm</a:t>
-            </a:r>
-            <a:r>
-              <a:rPr lang="en-GB" sz="3200" dirty="0"/>
-              <a:t> install </a:t>
-            </a:r>
-            <a:r>
-              <a:rPr lang="sv-SE" sz="3200" dirty="0"/>
-              <a:t>{package} [{package}]</a:t>
-            </a:r>
-            <a:endParaRPr lang="en-GB" sz="3200" dirty="0"/>
-          </a:p>
-          <a:p>
-            <a:r>
-              <a:rPr lang="sv-SE" sz="3200" dirty="0"/>
-              <a:t>npm install {package} --save</a:t>
-            </a:r>
-            <a:endParaRPr lang="en-GB" sz="3200" dirty="0"/>
-          </a:p>
-          <a:p>
-            <a:r>
-              <a:rPr lang="sv-SE" sz="3200" dirty="0"/>
-              <a:t>npm install {package} --save-dev</a:t>
-            </a:r>
-            <a:endParaRPr lang="en-GB" sz="3200" dirty="0"/>
-          </a:p>
-          <a:p>
-            <a:r>
-              <a:rPr lang="en-GB" sz="3200" dirty="0" err="1"/>
-              <a:t>npm</a:t>
-            </a:r>
-            <a:r>
-              <a:rPr lang="en-GB" sz="3200" dirty="0"/>
-              <a:t> publish</a:t>
-            </a:r>
-          </a:p>
-        </p:txBody>
-      </p:sp>
-    </p:spTree>
-    <p:extLst>
-      <p:ext uri="{BB962C8B-B14F-4D97-AF65-F5344CB8AC3E}">
-        <p14:creationId xmlns:p14="http://schemas.microsoft.com/office/powerpoint/2010/main" val="4292913891"/>
       </p:ext>
     </p:extLst>
   </p:cSld>
@@ -8511,6 +8582,141 @@
       </p:grpSpPr>
       <p:sp>
         <p:nvSpPr>
+          <p:cNvPr id="2" name="Title 1"/>
+          <p:cNvSpPr>
+            <a:spLocks noGrp="1"/>
+          </p:cNvSpPr>
+          <p:nvPr>
+            <p:ph type="title"/>
+          </p:nvPr>
+        </p:nvSpPr>
+        <p:spPr/>
+        <p:txBody>
+          <a:bodyPr>
+            <a:normAutofit/>
+          </a:bodyPr>
+          <a:lstStyle/>
+          <a:p>
+            <a:r>
+              <a:rPr lang="en-US" b="1" u="sng" dirty="0">
+                <a:solidFill>
+                  <a:schemeClr val="tx1"/>
+                </a:solidFill>
+              </a:rPr>
+              <a:t>NPM console</a:t>
+            </a:r>
+            <a:endParaRPr lang="bg-BG" b="1" u="sng" dirty="0">
+              <a:solidFill>
+                <a:schemeClr val="tx1"/>
+              </a:solidFill>
+            </a:endParaRPr>
+          </a:p>
+        </p:txBody>
+      </p:sp>
+      <p:sp>
+        <p:nvSpPr>
+          <p:cNvPr id="5" name="Content Placeholder 4"/>
+          <p:cNvSpPr>
+            <a:spLocks noGrp="1"/>
+          </p:cNvSpPr>
+          <p:nvPr>
+            <p:ph idx="1"/>
+          </p:nvPr>
+        </p:nvSpPr>
+        <p:spPr/>
+        <p:txBody>
+          <a:bodyPr>
+            <a:noAutofit/>
+          </a:bodyPr>
+          <a:lstStyle/>
+          <a:p>
+            <a:r>
+              <a:rPr lang="en-GB" sz="3200" dirty="0" err="1"/>
+              <a:t>npm</a:t>
+            </a:r>
+            <a:r>
+              <a:rPr lang="en-GB" sz="3200" dirty="0"/>
+              <a:t> </a:t>
+            </a:r>
+            <a:r>
+              <a:rPr lang="en-GB" sz="3200" dirty="0" err="1"/>
+              <a:t>init</a:t>
+            </a:r>
+            <a:endParaRPr lang="en-GB" sz="3200" dirty="0"/>
+          </a:p>
+          <a:p>
+            <a:r>
+              <a:rPr lang="en-GB" sz="3200" dirty="0" err="1"/>
+              <a:t>npm</a:t>
+            </a:r>
+            <a:r>
+              <a:rPr lang="en-GB" sz="3200" dirty="0"/>
+              <a:t> install </a:t>
+            </a:r>
+            <a:r>
+              <a:rPr lang="sv-SE" sz="3200" dirty="0"/>
+              <a:t>{package} [{package}]</a:t>
+            </a:r>
+            <a:endParaRPr lang="en-GB" sz="3200" dirty="0"/>
+          </a:p>
+          <a:p>
+            <a:r>
+              <a:rPr lang="sv-SE" sz="3200" dirty="0"/>
+              <a:t>npm install {package} --save</a:t>
+            </a:r>
+            <a:endParaRPr lang="en-GB" sz="3200" dirty="0"/>
+          </a:p>
+          <a:p>
+            <a:r>
+              <a:rPr lang="sv-SE" sz="3200" dirty="0"/>
+              <a:t>npm install {package} --save-dev</a:t>
+            </a:r>
+            <a:endParaRPr lang="en-GB" sz="3200" dirty="0"/>
+          </a:p>
+          <a:p>
+            <a:r>
+              <a:rPr lang="en-GB" sz="3200" dirty="0" err="1"/>
+              <a:t>npm</a:t>
+            </a:r>
+            <a:r>
+              <a:rPr lang="en-GB" sz="3200" dirty="0"/>
+              <a:t> publish</a:t>
+            </a:r>
+          </a:p>
+        </p:txBody>
+      </p:sp>
+    </p:spTree>
+    <p:extLst>
+      <p:ext uri="{BB962C8B-B14F-4D97-AF65-F5344CB8AC3E}">
+        <p14:creationId xmlns:p14="http://schemas.microsoft.com/office/powerpoint/2010/main" val="4292913891"/>
+      </p:ext>
+    </p:extLst>
+  </p:cSld>
+  <p:clrMapOvr>
+    <a:masterClrMapping/>
+  </p:clrMapOvr>
+</p:sld>
+</file>
+
+<file path=ppt/slides/slide24.xml><?xml version="1.0" encoding="utf-8"?>
+<p:sld xmlns:a="http://schemas.openxmlformats.org/drawingml/2006/main" xmlns:r="http://schemas.openxmlformats.org/officeDocument/2006/relationships" xmlns:p="http://schemas.openxmlformats.org/presentationml/2006/main">
+  <p:cSld>
+    <p:spTree>
+      <p:nvGrpSpPr>
+        <p:cNvPr id="1" name=""/>
+        <p:cNvGrpSpPr/>
+        <p:nvPr/>
+      </p:nvGrpSpPr>
+      <p:grpSpPr>
+        <a:xfrm>
+          <a:off x="0" y="0"/>
+          <a:ext cx="0" cy="0"/>
+          <a:chOff x="0" y="0"/>
+          <a:chExt cx="0" cy="0"/>
+        </a:xfrm>
+      </p:grpSpPr>
+      <p:sp>
+        <p:nvSpPr>
           <p:cNvPr id="5" name="Title 4"/>
           <p:cNvSpPr>
             <a:spLocks noGrp="1"/>
@@ -8572,7 +8778,7 @@
 </p:sld>
 </file>
 
-<file path=ppt/slides/slide24.xml><?xml version="1.0" encoding="utf-8"?>
+<file path=ppt/slides/slide25.xml><?xml version="1.0" encoding="utf-8"?>
 <p:sld xmlns:a="http://schemas.openxmlformats.org/drawingml/2006/main" xmlns:r="http://schemas.openxmlformats.org/officeDocument/2006/relationships" xmlns:p="http://schemas.openxmlformats.org/presentationml/2006/main">
   <p:cSld>
     <p:bg>
@@ -8668,111 +8874,6 @@
     <p:extLst>
       <p:ext uri="{BB962C8B-B14F-4D97-AF65-F5344CB8AC3E}">
         <p14:creationId xmlns:p14="http://schemas.microsoft.com/office/powerpoint/2010/main" val="300940235"/>
-      </p:ext>
-    </p:extLst>
-  </p:cSld>
-  <p:clrMapOvr>
-    <a:masterClrMapping/>
-  </p:clrMapOvr>
-</p:sld>
-</file>
-
-<file path=ppt/slides/slide25.xml><?xml version="1.0" encoding="utf-8"?>
-<p:sld xmlns:a="http://schemas.openxmlformats.org/drawingml/2006/main" xmlns:r="http://schemas.openxmlformats.org/officeDocument/2006/relationships" xmlns:p="http://schemas.openxmlformats.org/presentationml/2006/main">
-  <p:cSld>
-    <p:spTree>
-      <p:nvGrpSpPr>
-        <p:cNvPr id="1" name=""/>
-        <p:cNvGrpSpPr/>
-        <p:nvPr/>
-      </p:nvGrpSpPr>
-      <p:grpSpPr>
-        <a:xfrm>
-          <a:off x="0" y="0"/>
-          <a:ext cx="0" cy="0"/>
-          <a:chOff x="0" y="0"/>
-          <a:chExt cx="0" cy="0"/>
-        </a:xfrm>
-      </p:grpSpPr>
-      <p:sp>
-        <p:nvSpPr>
-          <p:cNvPr id="2" name="Title 1"/>
-          <p:cNvSpPr>
-            <a:spLocks noGrp="1"/>
-          </p:cNvSpPr>
-          <p:nvPr>
-            <p:ph type="title"/>
-          </p:nvPr>
-        </p:nvSpPr>
-        <p:spPr/>
-        <p:txBody>
-          <a:bodyPr>
-            <a:normAutofit/>
-          </a:bodyPr>
-          <a:lstStyle/>
-          <a:p>
-            <a:r>
-              <a:rPr lang="en-US" b="1" u="sng" dirty="0">
-                <a:solidFill>
-                  <a:schemeClr val="tx1"/>
-                </a:solidFill>
-              </a:rPr>
-              <a:t>What is REST?</a:t>
-            </a:r>
-            <a:endParaRPr lang="bg-BG" b="1" u="sng" dirty="0">
-              <a:solidFill>
-                <a:schemeClr val="tx1"/>
-              </a:solidFill>
-            </a:endParaRPr>
-          </a:p>
-        </p:txBody>
-      </p:sp>
-      <p:sp>
-        <p:nvSpPr>
-          <p:cNvPr id="5" name="Content Placeholder 4"/>
-          <p:cNvSpPr>
-            <a:spLocks noGrp="1"/>
-          </p:cNvSpPr>
-          <p:nvPr>
-            <p:ph idx="1"/>
-          </p:nvPr>
-        </p:nvSpPr>
-        <p:spPr/>
-        <p:txBody>
-          <a:bodyPr>
-            <a:noAutofit/>
-          </a:bodyPr>
-          <a:lstStyle/>
-          <a:p>
-            <a:r>
-              <a:rPr lang="en-US" sz="3200" dirty="0"/>
-              <a:t>Use HTTP/HTTPS</a:t>
-            </a:r>
-          </a:p>
-          <a:p>
-            <a:r>
-              <a:rPr lang="en-US" sz="3200" dirty="0"/>
-              <a:t>Use Verbs - GET, POST, PUT, DELETE</a:t>
-            </a:r>
-          </a:p>
-          <a:p>
-            <a:r>
-              <a:rPr lang="en-US" sz="3200" dirty="0"/>
-              <a:t>Use Status codes - 200, 201, 400, 403, 404</a:t>
-            </a:r>
-          </a:p>
-          <a:p>
-            <a:r>
-              <a:rPr lang="en-US" sz="3200" dirty="0"/>
-              <a:t>Caller dictates formats – Content-Type &amp; Accept </a:t>
-            </a:r>
-          </a:p>
-        </p:txBody>
-      </p:sp>
-    </p:spTree>
-    <p:extLst>
-      <p:ext uri="{BB962C8B-B14F-4D97-AF65-F5344CB8AC3E}">
-        <p14:creationId xmlns:p14="http://schemas.microsoft.com/office/powerpoint/2010/main" val="1332067026"/>
       </p:ext>
     </p:extLst>
   </p:cSld>
@@ -8811,48 +8912,73 @@
         </p:nvSpPr>
         <p:spPr/>
         <p:txBody>
-          <a:bodyPr/>
-          <a:lstStyle/>
-          <a:p>
-            <a:r>
-              <a:rPr lang="en-US" dirty="0"/>
-              <a:t>Demo </a:t>
-            </a:r>
-            <a:r>
-              <a:rPr lang="en-US" dirty="0" err="1"/>
-              <a:t>expressjs</a:t>
-            </a:r>
-            <a:endParaRPr lang="bg-BG" dirty="0"/>
-          </a:p>
-        </p:txBody>
-      </p:sp>
-      <p:sp>
-        <p:nvSpPr>
-          <p:cNvPr id="4" name="Text Placeholder 3"/>
-          <p:cNvSpPr>
-            <a:spLocks noGrp="1"/>
-          </p:cNvSpPr>
-          <p:nvPr>
-            <p:ph type="body" idx="1"/>
+          <a:bodyPr>
+            <a:normAutofit/>
+          </a:bodyPr>
+          <a:lstStyle/>
+          <a:p>
+            <a:r>
+              <a:rPr lang="en-US" b="1" u="sng" dirty="0">
+                <a:solidFill>
+                  <a:schemeClr val="tx1"/>
+                </a:solidFill>
+              </a:rPr>
+              <a:t>What is REST?</a:t>
+            </a:r>
+            <a:endParaRPr lang="bg-BG" b="1" u="sng" dirty="0">
+              <a:solidFill>
+                <a:schemeClr val="tx1"/>
+              </a:solidFill>
+            </a:endParaRPr>
+          </a:p>
+        </p:txBody>
+      </p:sp>
+      <p:sp>
+        <p:nvSpPr>
+          <p:cNvPr id="5" name="Content Placeholder 4"/>
+          <p:cNvSpPr>
+            <a:spLocks noGrp="1"/>
+          </p:cNvSpPr>
+          <p:nvPr>
+            <p:ph idx="1"/>
           </p:nvPr>
         </p:nvSpPr>
         <p:spPr/>
         <p:txBody>
-          <a:bodyPr/>
-          <a:lstStyle/>
-          <a:p>
-            <a:r>
-              <a:rPr lang="en-US" dirty="0" smtClean="0"/>
-              <a:t>ex4</a:t>
-            </a:r>
-            <a:endParaRPr lang="bg-BG" dirty="0"/>
+          <a:bodyPr>
+            <a:noAutofit/>
+          </a:bodyPr>
+          <a:lstStyle/>
+          <a:p>
+            <a:r>
+              <a:rPr lang="en-US" sz="3200" dirty="0"/>
+              <a:t>Use HTTP/HTTPS</a:t>
+            </a:r>
+          </a:p>
+          <a:p>
+            <a:r>
+              <a:rPr lang="en-US" sz="3200" dirty="0"/>
+              <a:t>Use Verbs - GET, POST, PUT, DELETE</a:t>
+            </a:r>
+          </a:p>
+          <a:p>
+            <a:r>
+              <a:rPr lang="en-US" sz="3200" dirty="0"/>
+              <a:t>Use Status codes - 200, 201, 400, 403, 404</a:t>
+            </a:r>
+          </a:p>
+          <a:p>
+            <a:r>
+              <a:rPr lang="en-US" sz="3200" dirty="0"/>
+              <a:t>Caller dictates formats – Content-Type &amp; Accept </a:t>
+            </a:r>
           </a:p>
         </p:txBody>
       </p:sp>
     </p:spTree>
     <p:extLst>
       <p:ext uri="{BB962C8B-B14F-4D97-AF65-F5344CB8AC3E}">
-        <p14:creationId xmlns:p14="http://schemas.microsoft.com/office/powerpoint/2010/main" val="2691171274"/>
+        <p14:creationId xmlns:p14="http://schemas.microsoft.com/office/powerpoint/2010/main" val="1332067026"/>
       </p:ext>
     </p:extLst>
   </p:cSld>
@@ -9655,6 +9781,86 @@
 <file path=ppt/slides/slide28.xml><?xml version="1.0" encoding="utf-8"?>
 <p:sld xmlns:a="http://schemas.openxmlformats.org/drawingml/2006/main" xmlns:r="http://schemas.openxmlformats.org/officeDocument/2006/relationships" xmlns:p="http://schemas.openxmlformats.org/presentationml/2006/main">
   <p:cSld>
+    <p:spTree>
+      <p:nvGrpSpPr>
+        <p:cNvPr id="1" name=""/>
+        <p:cNvGrpSpPr/>
+        <p:nvPr/>
+      </p:nvGrpSpPr>
+      <p:grpSpPr>
+        <a:xfrm>
+          <a:off x="0" y="0"/>
+          <a:ext cx="0" cy="0"/>
+          <a:chOff x="0" y="0"/>
+          <a:chExt cx="0" cy="0"/>
+        </a:xfrm>
+      </p:grpSpPr>
+      <p:sp>
+        <p:nvSpPr>
+          <p:cNvPr id="2" name="Title 1"/>
+          <p:cNvSpPr>
+            <a:spLocks noGrp="1"/>
+          </p:cNvSpPr>
+          <p:nvPr>
+            <p:ph type="title"/>
+          </p:nvPr>
+        </p:nvSpPr>
+        <p:spPr/>
+        <p:txBody>
+          <a:bodyPr/>
+          <a:lstStyle/>
+          <a:p>
+            <a:r>
+              <a:rPr lang="en-US" dirty="0"/>
+              <a:t>Demo </a:t>
+            </a:r>
+            <a:r>
+              <a:rPr lang="en-US" dirty="0" err="1"/>
+              <a:t>expressjs</a:t>
+            </a:r>
+            <a:endParaRPr lang="bg-BG" dirty="0"/>
+          </a:p>
+        </p:txBody>
+      </p:sp>
+      <p:sp>
+        <p:nvSpPr>
+          <p:cNvPr id="4" name="Text Placeholder 3"/>
+          <p:cNvSpPr>
+            <a:spLocks noGrp="1"/>
+          </p:cNvSpPr>
+          <p:nvPr>
+            <p:ph type="body" idx="1"/>
+          </p:nvPr>
+        </p:nvSpPr>
+        <p:spPr/>
+        <p:txBody>
+          <a:bodyPr/>
+          <a:lstStyle/>
+          <a:p>
+            <a:r>
+              <a:rPr lang="en-US" dirty="0" smtClean="0"/>
+              <a:t>ex4</a:t>
+            </a:r>
+            <a:endParaRPr lang="bg-BG" dirty="0"/>
+          </a:p>
+        </p:txBody>
+      </p:sp>
+    </p:spTree>
+    <p:extLst>
+      <p:ext uri="{BB962C8B-B14F-4D97-AF65-F5344CB8AC3E}">
+        <p14:creationId xmlns:p14="http://schemas.microsoft.com/office/powerpoint/2010/main" val="2691171274"/>
+      </p:ext>
+    </p:extLst>
+  </p:cSld>
+  <p:clrMapOvr>
+    <a:masterClrMapping/>
+  </p:clrMapOvr>
+</p:sld>
+</file>
+
+<file path=ppt/slides/slide29.xml><?xml version="1.0" encoding="utf-8"?>
+<p:sld xmlns:a="http://schemas.openxmlformats.org/drawingml/2006/main" xmlns:r="http://schemas.openxmlformats.org/officeDocument/2006/relationships" xmlns:p="http://schemas.openxmlformats.org/presentationml/2006/main">
+  <p:cSld>
     <p:bg>
       <p:bgPr>
         <a:solidFill>
@@ -9780,82 +9986,6 @@
     <p:extLst>
       <p:ext uri="{BB962C8B-B14F-4D97-AF65-F5344CB8AC3E}">
         <p14:creationId xmlns:p14="http://schemas.microsoft.com/office/powerpoint/2010/main" val="1525462165"/>
-      </p:ext>
-    </p:extLst>
-  </p:cSld>
-  <p:clrMapOvr>
-    <a:masterClrMapping/>
-  </p:clrMapOvr>
-</p:sld>
-</file>
-
-<file path=ppt/slides/slide29.xml><?xml version="1.0" encoding="utf-8"?>
-<p:sld xmlns:a="http://schemas.openxmlformats.org/drawingml/2006/main" xmlns:r="http://schemas.openxmlformats.org/officeDocument/2006/relationships" xmlns:p="http://schemas.openxmlformats.org/presentationml/2006/main">
-  <p:cSld>
-    <p:spTree>
-      <p:nvGrpSpPr>
-        <p:cNvPr id="1" name=""/>
-        <p:cNvGrpSpPr/>
-        <p:nvPr/>
-      </p:nvGrpSpPr>
-      <p:grpSpPr>
-        <a:xfrm>
-          <a:off x="0" y="0"/>
-          <a:ext cx="0" cy="0"/>
-          <a:chOff x="0" y="0"/>
-          <a:chExt cx="0" cy="0"/>
-        </a:xfrm>
-      </p:grpSpPr>
-      <p:sp>
-        <p:nvSpPr>
-          <p:cNvPr id="4" name="Title 3"/>
-          <p:cNvSpPr>
-            <a:spLocks noGrp="1"/>
-          </p:cNvSpPr>
-          <p:nvPr>
-            <p:ph type="title"/>
-          </p:nvPr>
-        </p:nvSpPr>
-        <p:spPr/>
-        <p:txBody>
-          <a:bodyPr/>
-          <a:lstStyle/>
-          <a:p>
-            <a:r>
-              <a:rPr lang="en-US" dirty="0"/>
-              <a:t>Demo unit test</a:t>
-            </a:r>
-            <a:endParaRPr lang="bg-BG" dirty="0"/>
-          </a:p>
-        </p:txBody>
-      </p:sp>
-      <p:sp>
-        <p:nvSpPr>
-          <p:cNvPr id="5" name="Text Placeholder 4"/>
-          <p:cNvSpPr>
-            <a:spLocks noGrp="1"/>
-          </p:cNvSpPr>
-          <p:nvPr>
-            <p:ph type="body" idx="1"/>
-          </p:nvPr>
-        </p:nvSpPr>
-        <p:spPr/>
-        <p:txBody>
-          <a:bodyPr/>
-          <a:lstStyle/>
-          <a:p>
-            <a:r>
-              <a:rPr lang="en-US" dirty="0" smtClean="0"/>
-              <a:t>ex5</a:t>
-            </a:r>
-            <a:endParaRPr lang="bg-BG" dirty="0"/>
-          </a:p>
-        </p:txBody>
-      </p:sp>
-    </p:spTree>
-    <p:extLst>
-      <p:ext uri="{BB962C8B-B14F-4D97-AF65-F5344CB8AC3E}">
-        <p14:creationId xmlns:p14="http://schemas.microsoft.com/office/powerpoint/2010/main" val="81045204"/>
       </p:ext>
     </p:extLst>
   </p:cSld>
@@ -9971,6 +10101,82 @@
     <p:extLst>
       <p:ext uri="{BB962C8B-B14F-4D97-AF65-F5344CB8AC3E}">
         <p14:creationId xmlns:p14="http://schemas.microsoft.com/office/powerpoint/2010/main" val="1869702916"/>
+      </p:ext>
+    </p:extLst>
+  </p:cSld>
+  <p:clrMapOvr>
+    <a:masterClrMapping/>
+  </p:clrMapOvr>
+</p:sld>
+</file>
+
+<file path=ppt/slides/slide30.xml><?xml version="1.0" encoding="utf-8"?>
+<p:sld xmlns:a="http://schemas.openxmlformats.org/drawingml/2006/main" xmlns:r="http://schemas.openxmlformats.org/officeDocument/2006/relationships" xmlns:p="http://schemas.openxmlformats.org/presentationml/2006/main">
+  <p:cSld>
+    <p:spTree>
+      <p:nvGrpSpPr>
+        <p:cNvPr id="1" name=""/>
+        <p:cNvGrpSpPr/>
+        <p:nvPr/>
+      </p:nvGrpSpPr>
+      <p:grpSpPr>
+        <a:xfrm>
+          <a:off x="0" y="0"/>
+          <a:ext cx="0" cy="0"/>
+          <a:chOff x="0" y="0"/>
+          <a:chExt cx="0" cy="0"/>
+        </a:xfrm>
+      </p:grpSpPr>
+      <p:sp>
+        <p:nvSpPr>
+          <p:cNvPr id="4" name="Title 3"/>
+          <p:cNvSpPr>
+            <a:spLocks noGrp="1"/>
+          </p:cNvSpPr>
+          <p:nvPr>
+            <p:ph type="title"/>
+          </p:nvPr>
+        </p:nvSpPr>
+        <p:spPr/>
+        <p:txBody>
+          <a:bodyPr/>
+          <a:lstStyle/>
+          <a:p>
+            <a:r>
+              <a:rPr lang="en-US" dirty="0"/>
+              <a:t>Demo unit test</a:t>
+            </a:r>
+            <a:endParaRPr lang="bg-BG" dirty="0"/>
+          </a:p>
+        </p:txBody>
+      </p:sp>
+      <p:sp>
+        <p:nvSpPr>
+          <p:cNvPr id="5" name="Text Placeholder 4"/>
+          <p:cNvSpPr>
+            <a:spLocks noGrp="1"/>
+          </p:cNvSpPr>
+          <p:nvPr>
+            <p:ph type="body" idx="1"/>
+          </p:nvPr>
+        </p:nvSpPr>
+        <p:spPr/>
+        <p:txBody>
+          <a:bodyPr/>
+          <a:lstStyle/>
+          <a:p>
+            <a:r>
+              <a:rPr lang="en-US" dirty="0" smtClean="0"/>
+              <a:t>ex5</a:t>
+            </a:r>
+            <a:endParaRPr lang="bg-BG" dirty="0"/>
+          </a:p>
+        </p:txBody>
+      </p:sp>
+    </p:spTree>
+    <p:extLst>
+      <p:ext uri="{BB962C8B-B14F-4D97-AF65-F5344CB8AC3E}">
+        <p14:creationId xmlns:p14="http://schemas.microsoft.com/office/powerpoint/2010/main" val="81045204"/>
       </p:ext>
     </p:extLst>
   </p:cSld>
@@ -10104,6 +10310,33 @@
           </a:p>
         </p:txBody>
       </p:sp>
+      <p:sp>
+        <p:nvSpPr>
+          <p:cNvPr id="13" name="Title 12"/>
+          <p:cNvSpPr>
+            <a:spLocks noGrp="1"/>
+          </p:cNvSpPr>
+          <p:nvPr>
+            <p:ph type="title"/>
+          </p:nvPr>
+        </p:nvSpPr>
+        <p:spPr/>
+        <p:txBody>
+          <a:bodyPr/>
+          <a:lstStyle/>
+          <a:p>
+            <a:r>
+              <a:rPr lang="en-US" u="sng" dirty="0"/>
+              <a:t>It is fast because its mostly C </a:t>
+            </a:r>
+            <a:r>
+              <a:rPr lang="en-US" u="sng" dirty="0" smtClean="0"/>
+              <a:t>code</a:t>
+            </a:r>
+            <a:endParaRPr lang="bg-BG" u="sng" dirty="0"/>
+          </a:p>
+        </p:txBody>
+      </p:sp>
     </p:spTree>
     <p:extLst>
       <p:ext uri="{BB962C8B-B14F-4D97-AF65-F5344CB8AC3E}">
@@ -10118,6 +10351,151 @@
 </file>
 
 <file path=ppt/slides/slide5.xml><?xml version="1.0" encoding="utf-8"?>
+<p:sld xmlns:a="http://schemas.openxmlformats.org/drawingml/2006/main" xmlns:r="http://schemas.openxmlformats.org/officeDocument/2006/relationships" xmlns:p="http://schemas.openxmlformats.org/presentationml/2006/main">
+  <p:cSld>
+    <p:bg>
+      <p:bgPr>
+        <a:solidFill>
+          <a:srgbClr val="0070C0"/>
+        </a:solidFill>
+        <a:effectLst/>
+      </p:bgPr>
+    </p:bg>
+    <p:spTree>
+      <p:nvGrpSpPr>
+        <p:cNvPr id="1" name=""/>
+        <p:cNvGrpSpPr/>
+        <p:nvPr/>
+      </p:nvGrpSpPr>
+      <p:grpSpPr>
+        <a:xfrm>
+          <a:off x="0" y="0"/>
+          <a:ext cx="0" cy="0"/>
+          <a:chOff x="0" y="0"/>
+          <a:chExt cx="0" cy="0"/>
+        </a:xfrm>
+      </p:grpSpPr>
+      <p:sp>
+        <p:nvSpPr>
+          <p:cNvPr id="2" name="Title 1"/>
+          <p:cNvSpPr>
+            <a:spLocks noGrp="1"/>
+          </p:cNvSpPr>
+          <p:nvPr>
+            <p:ph type="title"/>
+          </p:nvPr>
+        </p:nvSpPr>
+        <p:spPr/>
+        <p:txBody>
+          <a:bodyPr/>
+          <a:lstStyle/>
+          <a:p>
+            <a:r>
+              <a:rPr lang="en-US" b="1" u="sng" dirty="0" smtClean="0">
+                <a:solidFill>
+                  <a:schemeClr val="bg1"/>
+                </a:solidFill>
+              </a:rPr>
+              <a:t>What we can build?</a:t>
+            </a:r>
+            <a:endParaRPr lang="bg-BG" b="1" u="sng" dirty="0">
+              <a:solidFill>
+                <a:schemeClr val="bg1"/>
+              </a:solidFill>
+            </a:endParaRPr>
+          </a:p>
+        </p:txBody>
+      </p:sp>
+      <p:sp>
+        <p:nvSpPr>
+          <p:cNvPr id="3" name="Content Placeholder 2"/>
+          <p:cNvSpPr>
+            <a:spLocks noGrp="1"/>
+          </p:cNvSpPr>
+          <p:nvPr>
+            <p:ph idx="1"/>
+          </p:nvPr>
+        </p:nvSpPr>
+        <p:spPr>
+          <a:xfrm>
+            <a:off x="1371600" y="2286000"/>
+            <a:ext cx="8674768" cy="3581400"/>
+          </a:xfrm>
+        </p:spPr>
+        <p:txBody>
+          <a:bodyPr>
+            <a:normAutofit/>
+          </a:bodyPr>
+          <a:lstStyle/>
+          <a:p>
+            <a:r>
+              <a:rPr lang="en-US" sz="3200" dirty="0" err="1" smtClean="0">
+                <a:solidFill>
+                  <a:schemeClr val="bg1"/>
+                </a:solidFill>
+              </a:rPr>
+              <a:t>Websocket</a:t>
+            </a:r>
+            <a:r>
+              <a:rPr lang="en-US" sz="3200" dirty="0" smtClean="0">
+                <a:solidFill>
+                  <a:schemeClr val="bg1"/>
+                </a:solidFill>
+              </a:rPr>
+              <a:t> Server</a:t>
+            </a:r>
+          </a:p>
+          <a:p>
+            <a:r>
+              <a:rPr lang="en-US" sz="3200" dirty="0" smtClean="0">
+                <a:solidFill>
+                  <a:schemeClr val="bg1"/>
+                </a:solidFill>
+              </a:rPr>
+              <a:t>Fast File Upload Client</a:t>
+            </a:r>
+          </a:p>
+          <a:p>
+            <a:r>
+              <a:rPr lang="en-US" sz="3200" dirty="0" smtClean="0">
+                <a:solidFill>
+                  <a:schemeClr val="bg1"/>
+                </a:solidFill>
+              </a:rPr>
+              <a:t>Ad Server</a:t>
+            </a:r>
+          </a:p>
+          <a:p>
+            <a:r>
+              <a:rPr lang="en-US" sz="3200" dirty="0" smtClean="0">
+                <a:solidFill>
+                  <a:schemeClr val="bg1"/>
+                </a:solidFill>
+              </a:rPr>
+              <a:t>Any Real-Time Data Apps</a:t>
+            </a:r>
+            <a:endParaRPr lang="bg-BG" sz="3200" dirty="0">
+              <a:solidFill>
+                <a:schemeClr val="bg1"/>
+              </a:solidFill>
+            </a:endParaRPr>
+          </a:p>
+        </p:txBody>
+      </p:sp>
+    </p:spTree>
+    <p:extLst>
+      <p:ext uri="{BB962C8B-B14F-4D97-AF65-F5344CB8AC3E}">
+        <p14:creationId xmlns:p14="http://schemas.microsoft.com/office/powerpoint/2010/main" val="2187718004"/>
+      </p:ext>
+    </p:extLst>
+  </p:cSld>
+  <p:clrMapOvr>
+    <a:masterClrMapping/>
+  </p:clrMapOvr>
+</p:sld>
+</file>
+
+<file path=ppt/slides/slide6.xml><?xml version="1.0" encoding="utf-8"?>
 <p:sld xmlns:a="http://schemas.openxmlformats.org/drawingml/2006/main" xmlns:r="http://schemas.openxmlformats.org/officeDocument/2006/relationships" xmlns:p="http://schemas.openxmlformats.org/presentationml/2006/main">
   <p:cSld>
     <p:spTree>
@@ -11990,7 +12368,7 @@
 </p:sld>
 </file>
 
-<file path=ppt/slides/slide6.xml><?xml version="1.0" encoding="utf-8"?>
+<file path=ppt/slides/slide7.xml><?xml version="1.0" encoding="utf-8"?>
 <p:sld xmlns:a="http://schemas.openxmlformats.org/drawingml/2006/main" xmlns:r="http://schemas.openxmlformats.org/officeDocument/2006/relationships" xmlns:p="http://schemas.openxmlformats.org/presentationml/2006/main">
   <p:cSld>
     <p:spTree>
@@ -12061,7 +12439,7 @@
 </p:sld>
 </file>
 
-<file path=ppt/slides/slide7.xml><?xml version="1.0" encoding="utf-8"?>
+<file path=ppt/slides/slide8.xml><?xml version="1.0" encoding="utf-8"?>
 <p:sld xmlns:a="http://schemas.openxmlformats.org/drawingml/2006/main" xmlns:r="http://schemas.openxmlformats.org/officeDocument/2006/relationships" xmlns:p="http://schemas.openxmlformats.org/presentationml/2006/main">
   <p:cSld>
     <p:spTree>
@@ -12139,7 +12517,7 @@
 </p:sld>
 </file>
 
-<file path=ppt/slides/slide8.xml><?xml version="1.0" encoding="utf-8"?>
+<file path=ppt/slides/slide9.xml><?xml version="1.0" encoding="utf-8"?>
 <p:sld xmlns:a="http://schemas.openxmlformats.org/drawingml/2006/main" xmlns:r="http://schemas.openxmlformats.org/officeDocument/2006/relationships" xmlns:p="http://schemas.openxmlformats.org/presentationml/2006/main">
   <p:cSld>
     <p:bg>
@@ -12180,12 +12558,12 @@
           <a:lstStyle/>
           <a:p>
             <a:r>
-              <a:rPr lang="en-US" b="1" u="sng" dirty="0">
+              <a:rPr lang="en-US" b="1" u="sng" dirty="0" smtClean="0">
                 <a:solidFill>
                   <a:schemeClr val="bg1"/>
                 </a:solidFill>
               </a:rPr>
-              <a:t>What is JavaScript?</a:t>
+              <a:t>Ryan Dahl – Why JS</a:t>
             </a:r>
             <a:endParaRPr lang="bg-BG" b="1" u="sng" dirty="0">
               <a:solidFill>
@@ -12213,12 +12591,12 @@
           <a:lstStyle/>
           <a:p>
             <a:r>
-              <a:rPr lang="en-US" sz="3200" dirty="0">
+              <a:rPr lang="en-US" sz="3200" dirty="0" smtClean="0">
                 <a:solidFill>
                   <a:schemeClr val="bg1"/>
                 </a:solidFill>
               </a:rPr>
-              <a:t>JavaScript (JS) is a lightweight, interpreted, programming language with first-class functions. JS is a prototype-based, multi-paradigm, dynamic scripting language, supporting object-oriented, imperative, and declarative (e.g. functional programming) styles.</a:t>
+              <a:t>JavaScript has certain characteristics that make it very different that other dynamic languages, namely that it has no concept of threads. Its model of concurrency is completely based around events.</a:t>
             </a:r>
             <a:endParaRPr lang="sv-SE" sz="3200" dirty="0">
               <a:solidFill>
@@ -12232,145 +12610,6 @@
     <p:extLst>
       <p:ext uri="{BB962C8B-B14F-4D97-AF65-F5344CB8AC3E}">
         <p14:creationId xmlns:p14="http://schemas.microsoft.com/office/powerpoint/2010/main" val="708585322"/>
-      </p:ext>
-    </p:extLst>
-  </p:cSld>
-  <p:clrMapOvr>
-    <a:masterClrMapping/>
-  </p:clrMapOvr>
-</p:sld>
-</file>
-
-<file path=ppt/slides/slide9.xml><?xml version="1.0" encoding="utf-8"?>
-<p:sld xmlns:a="http://schemas.openxmlformats.org/drawingml/2006/main" xmlns:r="http://schemas.openxmlformats.org/officeDocument/2006/relationships" xmlns:p="http://schemas.openxmlformats.org/presentationml/2006/main">
-  <p:cSld>
-    <p:spTree>
-      <p:nvGrpSpPr>
-        <p:cNvPr id="1" name=""/>
-        <p:cNvGrpSpPr/>
-        <p:nvPr/>
-      </p:nvGrpSpPr>
-      <p:grpSpPr>
-        <a:xfrm>
-          <a:off x="0" y="0"/>
-          <a:ext cx="0" cy="0"/>
-          <a:chOff x="0" y="0"/>
-          <a:chExt cx="0" cy="0"/>
-        </a:xfrm>
-      </p:grpSpPr>
-      <p:sp>
-        <p:nvSpPr>
-          <p:cNvPr id="2" name="Title 1"/>
-          <p:cNvSpPr>
-            <a:spLocks noGrp="1"/>
-          </p:cNvSpPr>
-          <p:nvPr>
-            <p:ph type="title"/>
-          </p:nvPr>
-        </p:nvSpPr>
-        <p:spPr/>
-        <p:txBody>
-          <a:bodyPr/>
-          <a:lstStyle/>
-          <a:p>
-            <a:r>
-              <a:rPr lang="en-US" b="1" u="sng" dirty="0">
-                <a:solidFill>
-                  <a:schemeClr val="tx1"/>
-                </a:solidFill>
-              </a:rPr>
-              <a:t>JavaScript syntax</a:t>
-            </a:r>
-            <a:endParaRPr lang="bg-BG" b="1" u="sng" dirty="0">
-              <a:solidFill>
-                <a:schemeClr val="tx1"/>
-              </a:solidFill>
-            </a:endParaRPr>
-          </a:p>
-        </p:txBody>
-      </p:sp>
-      <p:sp>
-        <p:nvSpPr>
-          <p:cNvPr id="5" name="Content Placeholder 4"/>
-          <p:cNvSpPr>
-            <a:spLocks noGrp="1"/>
-          </p:cNvSpPr>
-          <p:nvPr>
-            <p:ph idx="1"/>
-          </p:nvPr>
-        </p:nvSpPr>
-        <p:spPr/>
-        <p:txBody>
-          <a:bodyPr>
-            <a:normAutofit lnSpcReduction="10000"/>
-          </a:bodyPr>
-          <a:lstStyle/>
-          <a:p>
-            <a:r>
-              <a:rPr lang="sv-SE" sz="3200" dirty="0">
-                <a:solidFill>
-                  <a:schemeClr val="tx1"/>
-                </a:solidFill>
-              </a:rPr>
-              <a:t>Values and Types</a:t>
-            </a:r>
-          </a:p>
-          <a:p>
-            <a:r>
-              <a:rPr lang="sv-SE" sz="3200" dirty="0">
-                <a:solidFill>
-                  <a:schemeClr val="tx1"/>
-                </a:solidFill>
-              </a:rPr>
-              <a:t>Operators</a:t>
-            </a:r>
-          </a:p>
-          <a:p>
-            <a:r>
-              <a:rPr lang="sv-SE" sz="3200" dirty="0">
-                <a:solidFill>
-                  <a:schemeClr val="tx1"/>
-                </a:solidFill>
-              </a:rPr>
-              <a:t>Variables and Blocks</a:t>
-            </a:r>
-          </a:p>
-          <a:p>
-            <a:r>
-              <a:rPr lang="sv-SE" sz="3200" dirty="0">
-                <a:solidFill>
-                  <a:schemeClr val="tx1"/>
-                </a:solidFill>
-              </a:rPr>
-              <a:t>Conditional statemets</a:t>
-            </a:r>
-          </a:p>
-          <a:p>
-            <a:r>
-              <a:rPr lang="sv-SE" sz="3200" dirty="0">
-                <a:solidFill>
-                  <a:schemeClr val="tx1"/>
-                </a:solidFill>
-              </a:rPr>
-              <a:t>Loops</a:t>
-            </a:r>
-          </a:p>
-          <a:p>
-            <a:r>
-              <a:rPr lang="sv-SE" sz="3200" dirty="0">
-                <a:solidFill>
-                  <a:schemeClr val="tx1"/>
-                </a:solidFill>
-              </a:rPr>
-              <a:t>Functions</a:t>
-            </a:r>
-          </a:p>
-        </p:txBody>
-      </p:sp>
-    </p:spTree>
-    <p:extLst>
-      <p:ext uri="{BB962C8B-B14F-4D97-AF65-F5344CB8AC3E}">
-        <p14:creationId xmlns:p14="http://schemas.microsoft.com/office/powerpoint/2010/main" val="3627279298"/>
       </p:ext>
     </p:extLst>
   </p:cSld>

</xml_diff>